<commit_message>
forme finale de mon projet 4 Menu Maker
</commit_message>
<xml_diff>
--- a/présentation_livrable_4.pptx
+++ b/présentation_livrable_4.pptx
@@ -4,6 +4,9 @@
   <p:sldMasterIdLst>
     <p:sldMasterId id="2147483648" r:id="rId1"/>
   </p:sldMasterIdLst>
+  <p:notesMasterIdLst>
+    <p:notesMasterId r:id="rId16"/>
+  </p:notesMasterIdLst>
   <p:sldIdLst>
     <p:sldId id="257" r:id="rId2"/>
     <p:sldId id="269" r:id="rId3"/>
@@ -15,8 +18,10 @@
     <p:sldId id="262" r:id="rId9"/>
     <p:sldId id="263" r:id="rId10"/>
     <p:sldId id="264" r:id="rId11"/>
-    <p:sldId id="268" r:id="rId12"/>
-    <p:sldId id="267" r:id="rId13"/>
+    <p:sldId id="271" r:id="rId12"/>
+    <p:sldId id="270" r:id="rId13"/>
+    <p:sldId id="272" r:id="rId14"/>
+    <p:sldId id="267" r:id="rId15"/>
   </p:sldIdLst>
   <p:sldSz cx="12192000" cy="6858000"/>
   <p:notesSz cx="6858000" cy="9144000"/>
@@ -115,7 +120,361 @@
       </a:defRPr>
     </a:lvl9pPr>
   </p:defaultTextStyle>
+  <p:extLst>
+    <p:ext uri="{EFAFB233-063F-42B5-8137-9DF3F51BA10A}">
+      <p15:sldGuideLst xmlns:p15="http://schemas.microsoft.com/office/powerpoint/2012/main"/>
+    </p:ext>
+  </p:extLst>
 </p:presentation>
+</file>
+
+<file path=ppt/notesMasters/notesMaster1.xml><?xml version="1.0" encoding="utf-8"?>
+<p:notesMaster xmlns:a="http://schemas.openxmlformats.org/drawingml/2006/main" xmlns:r="http://schemas.openxmlformats.org/officeDocument/2006/relationships" xmlns:p="http://schemas.openxmlformats.org/presentationml/2006/main">
+  <p:cSld>
+    <p:bg>
+      <p:bgRef idx="1001">
+        <a:schemeClr val="bg1"/>
+      </p:bgRef>
+    </p:bg>
+    <p:spTree>
+      <p:nvGrpSpPr>
+        <p:cNvPr id="1" name=""/>
+        <p:cNvGrpSpPr/>
+        <p:nvPr/>
+      </p:nvGrpSpPr>
+      <p:grpSpPr>
+        <a:xfrm>
+          <a:off x="0" y="0"/>
+          <a:ext cx="0" cy="0"/>
+          <a:chOff x="0" y="0"/>
+          <a:chExt cx="0" cy="0"/>
+        </a:xfrm>
+      </p:grpSpPr>
+      <p:sp>
+        <p:nvSpPr>
+          <p:cNvPr id="2" name="Espace réservé de l'en-tête 1"/>
+          <p:cNvSpPr>
+            <a:spLocks noGrp="1"/>
+          </p:cNvSpPr>
+          <p:nvPr>
+            <p:ph type="hdr" sz="quarter"/>
+          </p:nvPr>
+        </p:nvSpPr>
+        <p:spPr>
+          <a:xfrm>
+            <a:off x="0" y="0"/>
+            <a:ext cx="2971800" cy="458788"/>
+          </a:xfrm>
+          <a:prstGeom prst="rect">
+            <a:avLst/>
+          </a:prstGeom>
+        </p:spPr>
+        <p:txBody>
+          <a:bodyPr vert="horz" lIns="91440" tIns="45720" rIns="91440" bIns="45720" rtlCol="0"/>
+          <a:lstStyle>
+            <a:lvl1pPr algn="l">
+              <a:defRPr sz="1200"/>
+            </a:lvl1pPr>
+          </a:lstStyle>
+          <a:p>
+            <a:endParaRPr lang="fr-FR"/>
+          </a:p>
+        </p:txBody>
+      </p:sp>
+      <p:sp>
+        <p:nvSpPr>
+          <p:cNvPr id="3" name="Espace réservé de la date 2"/>
+          <p:cNvSpPr>
+            <a:spLocks noGrp="1"/>
+          </p:cNvSpPr>
+          <p:nvPr>
+            <p:ph type="dt" idx="1"/>
+          </p:nvPr>
+        </p:nvSpPr>
+        <p:spPr>
+          <a:xfrm>
+            <a:off x="3884613" y="0"/>
+            <a:ext cx="2971800" cy="458788"/>
+          </a:xfrm>
+          <a:prstGeom prst="rect">
+            <a:avLst/>
+          </a:prstGeom>
+        </p:spPr>
+        <p:txBody>
+          <a:bodyPr vert="horz" lIns="91440" tIns="45720" rIns="91440" bIns="45720" rtlCol="0"/>
+          <a:lstStyle>
+            <a:lvl1pPr algn="r">
+              <a:defRPr sz="1200"/>
+            </a:lvl1pPr>
+          </a:lstStyle>
+          <a:p>
+            <a:fld id="{C211CFE5-C993-42C5-98EA-8B565CFA01B3}" type="datetimeFigureOut">
+              <a:rPr lang="fr-FR" smtClean="0"/>
+              <a:t>10/05/2023</a:t>
+            </a:fld>
+            <a:endParaRPr lang="fr-FR"/>
+          </a:p>
+        </p:txBody>
+      </p:sp>
+      <p:sp>
+        <p:nvSpPr>
+          <p:cNvPr id="4" name="Espace réservé de l'image des diapositives 3"/>
+          <p:cNvSpPr>
+            <a:spLocks noGrp="1" noRot="1" noChangeAspect="1"/>
+          </p:cNvSpPr>
+          <p:nvPr>
+            <p:ph type="sldImg" idx="2"/>
+          </p:nvPr>
+        </p:nvSpPr>
+        <p:spPr>
+          <a:xfrm>
+            <a:off x="685800" y="1143000"/>
+            <a:ext cx="5486400" cy="3086100"/>
+          </a:xfrm>
+          <a:prstGeom prst="rect">
+            <a:avLst/>
+          </a:prstGeom>
+          <a:noFill/>
+          <a:ln w="12700">
+            <a:solidFill>
+              <a:prstClr val="black"/>
+            </a:solidFill>
+          </a:ln>
+        </p:spPr>
+        <p:txBody>
+          <a:bodyPr vert="horz" lIns="91440" tIns="45720" rIns="91440" bIns="45720" rtlCol="0" anchor="ctr"/>
+          <a:lstStyle/>
+          <a:p>
+            <a:endParaRPr lang="fr-FR"/>
+          </a:p>
+        </p:txBody>
+      </p:sp>
+      <p:sp>
+        <p:nvSpPr>
+          <p:cNvPr id="5" name="Espace réservé des notes 4"/>
+          <p:cNvSpPr>
+            <a:spLocks noGrp="1"/>
+          </p:cNvSpPr>
+          <p:nvPr>
+            <p:ph type="body" sz="quarter" idx="3"/>
+          </p:nvPr>
+        </p:nvSpPr>
+        <p:spPr>
+          <a:xfrm>
+            <a:off x="685800" y="4400550"/>
+            <a:ext cx="5486400" cy="3600450"/>
+          </a:xfrm>
+          <a:prstGeom prst="rect">
+            <a:avLst/>
+          </a:prstGeom>
+        </p:spPr>
+        <p:txBody>
+          <a:bodyPr vert="horz" lIns="91440" tIns="45720" rIns="91440" bIns="45720" rtlCol="0"/>
+          <a:lstStyle/>
+          <a:p>
+            <a:pPr lvl="0"/>
+            <a:r>
+              <a:rPr lang="fr-FR"/>
+              <a:t>Cliquez pour modifier les styles du texte du masque</a:t>
+            </a:r>
+          </a:p>
+          <a:p>
+            <a:pPr lvl="1"/>
+            <a:r>
+              <a:rPr lang="fr-FR"/>
+              <a:t>Deuxième niveau</a:t>
+            </a:r>
+          </a:p>
+          <a:p>
+            <a:pPr lvl="2"/>
+            <a:r>
+              <a:rPr lang="fr-FR"/>
+              <a:t>Troisième niveau</a:t>
+            </a:r>
+          </a:p>
+          <a:p>
+            <a:pPr lvl="3"/>
+            <a:r>
+              <a:rPr lang="fr-FR"/>
+              <a:t>Quatrième niveau</a:t>
+            </a:r>
+          </a:p>
+          <a:p>
+            <a:pPr lvl="4"/>
+            <a:r>
+              <a:rPr lang="fr-FR"/>
+              <a:t>Cinquième niveau</a:t>
+            </a:r>
+          </a:p>
+        </p:txBody>
+      </p:sp>
+      <p:sp>
+        <p:nvSpPr>
+          <p:cNvPr id="6" name="Espace réservé du pied de page 5"/>
+          <p:cNvSpPr>
+            <a:spLocks noGrp="1"/>
+          </p:cNvSpPr>
+          <p:nvPr>
+            <p:ph type="ftr" sz="quarter" idx="4"/>
+          </p:nvPr>
+        </p:nvSpPr>
+        <p:spPr>
+          <a:xfrm>
+            <a:off x="0" y="8685213"/>
+            <a:ext cx="2971800" cy="458787"/>
+          </a:xfrm>
+          <a:prstGeom prst="rect">
+            <a:avLst/>
+          </a:prstGeom>
+        </p:spPr>
+        <p:txBody>
+          <a:bodyPr vert="horz" lIns="91440" tIns="45720" rIns="91440" bIns="45720" rtlCol="0" anchor="b"/>
+          <a:lstStyle>
+            <a:lvl1pPr algn="l">
+              <a:defRPr sz="1200"/>
+            </a:lvl1pPr>
+          </a:lstStyle>
+          <a:p>
+            <a:endParaRPr lang="fr-FR"/>
+          </a:p>
+        </p:txBody>
+      </p:sp>
+      <p:sp>
+        <p:nvSpPr>
+          <p:cNvPr id="7" name="Espace réservé du numéro de diapositive 6"/>
+          <p:cNvSpPr>
+            <a:spLocks noGrp="1"/>
+          </p:cNvSpPr>
+          <p:nvPr>
+            <p:ph type="sldNum" sz="quarter" idx="5"/>
+          </p:nvPr>
+        </p:nvSpPr>
+        <p:spPr>
+          <a:xfrm>
+            <a:off x="3884613" y="8685213"/>
+            <a:ext cx="2971800" cy="458787"/>
+          </a:xfrm>
+          <a:prstGeom prst="rect">
+            <a:avLst/>
+          </a:prstGeom>
+        </p:spPr>
+        <p:txBody>
+          <a:bodyPr vert="horz" lIns="91440" tIns="45720" rIns="91440" bIns="45720" rtlCol="0" anchor="b"/>
+          <a:lstStyle>
+            <a:lvl1pPr algn="r">
+              <a:defRPr sz="1200"/>
+            </a:lvl1pPr>
+          </a:lstStyle>
+          <a:p>
+            <a:fld id="{CD8D6138-8BA6-477E-9713-A0018C1F6984}" type="slidenum">
+              <a:rPr lang="fr-FR" smtClean="0"/>
+              <a:t>‹N°›</a:t>
+            </a:fld>
+            <a:endParaRPr lang="fr-FR"/>
+          </a:p>
+        </p:txBody>
+      </p:sp>
+    </p:spTree>
+    <p:extLst>
+      <p:ext uri="{BB962C8B-B14F-4D97-AF65-F5344CB8AC3E}">
+        <p14:creationId xmlns:p14="http://schemas.microsoft.com/office/powerpoint/2010/main" val="2460699981"/>
+      </p:ext>
+    </p:extLst>
+  </p:cSld>
+  <p:clrMap bg1="lt1" tx1="dk1" bg2="lt2" tx2="dk2" accent1="accent1" accent2="accent2" accent3="accent3" accent4="accent4" accent5="accent5" accent6="accent6" hlink="hlink" folHlink="folHlink"/>
+  <p:notesStyle>
+    <a:lvl1pPr marL="0" algn="l" defTabSz="914400" rtl="0" eaLnBrk="1" latinLnBrk="0" hangingPunct="1">
+      <a:defRPr sz="1200" kern="1200">
+        <a:solidFill>
+          <a:schemeClr val="tx1"/>
+        </a:solidFill>
+        <a:latin typeface="+mn-lt"/>
+        <a:ea typeface="+mn-ea"/>
+        <a:cs typeface="+mn-cs"/>
+      </a:defRPr>
+    </a:lvl1pPr>
+    <a:lvl2pPr marL="457200" algn="l" defTabSz="914400" rtl="0" eaLnBrk="1" latinLnBrk="0" hangingPunct="1">
+      <a:defRPr sz="1200" kern="1200">
+        <a:solidFill>
+          <a:schemeClr val="tx1"/>
+        </a:solidFill>
+        <a:latin typeface="+mn-lt"/>
+        <a:ea typeface="+mn-ea"/>
+        <a:cs typeface="+mn-cs"/>
+      </a:defRPr>
+    </a:lvl2pPr>
+    <a:lvl3pPr marL="914400" algn="l" defTabSz="914400" rtl="0" eaLnBrk="1" latinLnBrk="0" hangingPunct="1">
+      <a:defRPr sz="1200" kern="1200">
+        <a:solidFill>
+          <a:schemeClr val="tx1"/>
+        </a:solidFill>
+        <a:latin typeface="+mn-lt"/>
+        <a:ea typeface="+mn-ea"/>
+        <a:cs typeface="+mn-cs"/>
+      </a:defRPr>
+    </a:lvl3pPr>
+    <a:lvl4pPr marL="1371600" algn="l" defTabSz="914400" rtl="0" eaLnBrk="1" latinLnBrk="0" hangingPunct="1">
+      <a:defRPr sz="1200" kern="1200">
+        <a:solidFill>
+          <a:schemeClr val="tx1"/>
+        </a:solidFill>
+        <a:latin typeface="+mn-lt"/>
+        <a:ea typeface="+mn-ea"/>
+        <a:cs typeface="+mn-cs"/>
+      </a:defRPr>
+    </a:lvl4pPr>
+    <a:lvl5pPr marL="1828800" algn="l" defTabSz="914400" rtl="0" eaLnBrk="1" latinLnBrk="0" hangingPunct="1">
+      <a:defRPr sz="1200" kern="1200">
+        <a:solidFill>
+          <a:schemeClr val="tx1"/>
+        </a:solidFill>
+        <a:latin typeface="+mn-lt"/>
+        <a:ea typeface="+mn-ea"/>
+        <a:cs typeface="+mn-cs"/>
+      </a:defRPr>
+    </a:lvl5pPr>
+    <a:lvl6pPr marL="2286000" algn="l" defTabSz="914400" rtl="0" eaLnBrk="1" latinLnBrk="0" hangingPunct="1">
+      <a:defRPr sz="1200" kern="1200">
+        <a:solidFill>
+          <a:schemeClr val="tx1"/>
+        </a:solidFill>
+        <a:latin typeface="+mn-lt"/>
+        <a:ea typeface="+mn-ea"/>
+        <a:cs typeface="+mn-cs"/>
+      </a:defRPr>
+    </a:lvl6pPr>
+    <a:lvl7pPr marL="2743200" algn="l" defTabSz="914400" rtl="0" eaLnBrk="1" latinLnBrk="0" hangingPunct="1">
+      <a:defRPr sz="1200" kern="1200">
+        <a:solidFill>
+          <a:schemeClr val="tx1"/>
+        </a:solidFill>
+        <a:latin typeface="+mn-lt"/>
+        <a:ea typeface="+mn-ea"/>
+        <a:cs typeface="+mn-cs"/>
+      </a:defRPr>
+    </a:lvl7pPr>
+    <a:lvl8pPr marL="3200400" algn="l" defTabSz="914400" rtl="0" eaLnBrk="1" latinLnBrk="0" hangingPunct="1">
+      <a:defRPr sz="1200" kern="1200">
+        <a:solidFill>
+          <a:schemeClr val="tx1"/>
+        </a:solidFill>
+        <a:latin typeface="+mn-lt"/>
+        <a:ea typeface="+mn-ea"/>
+        <a:cs typeface="+mn-cs"/>
+      </a:defRPr>
+    </a:lvl8pPr>
+    <a:lvl9pPr marL="3657600" algn="l" defTabSz="914400" rtl="0" eaLnBrk="1" latinLnBrk="0" hangingPunct="1">
+      <a:defRPr sz="1200" kern="1200">
+        <a:solidFill>
+          <a:schemeClr val="tx1"/>
+        </a:solidFill>
+        <a:latin typeface="+mn-lt"/>
+        <a:ea typeface="+mn-ea"/>
+        <a:cs typeface="+mn-cs"/>
+      </a:defRPr>
+    </a:lvl9pPr>
+  </p:notesStyle>
+</p:notesMaster>
 </file>
 
 <file path=ppt/slideLayouts/slideLayout1.xml><?xml version="1.0" encoding="utf-8"?>
@@ -263,9 +622,9 @@
           <a:bodyPr/>
           <a:lstStyle/>
           <a:p>
-            <a:fld id="{B772CE12-9C45-42A3-8B94-7DA904E53F03}" type="datetimeFigureOut">
+            <a:fld id="{8942A053-BC5C-429E-8596-9991BA4F2132}" type="datetime1">
               <a:rPr lang="fr-FR" smtClean="0"/>
-              <a:t>05/05/2023</a:t>
+              <a:t>10/05/2023</a:t>
             </a:fld>
             <a:endParaRPr lang="fr-FR"/>
           </a:p>
@@ -461,9 +820,9 @@
           <a:bodyPr/>
           <a:lstStyle/>
           <a:p>
-            <a:fld id="{B772CE12-9C45-42A3-8B94-7DA904E53F03}" type="datetimeFigureOut">
+            <a:fld id="{0629E193-497C-4922-A0C6-4AC60B37B8DE}" type="datetime1">
               <a:rPr lang="fr-FR" smtClean="0"/>
-              <a:t>05/05/2023</a:t>
+              <a:t>10/05/2023</a:t>
             </a:fld>
             <a:endParaRPr lang="fr-FR"/>
           </a:p>
@@ -669,9 +1028,9 @@
           <a:bodyPr/>
           <a:lstStyle/>
           <a:p>
-            <a:fld id="{B772CE12-9C45-42A3-8B94-7DA904E53F03}" type="datetimeFigureOut">
+            <a:fld id="{516D56D8-D367-4610-937F-6DC4D4CA74A2}" type="datetime1">
               <a:rPr lang="fr-FR" smtClean="0"/>
-              <a:t>05/05/2023</a:t>
+              <a:t>10/05/2023</a:t>
             </a:fld>
             <a:endParaRPr lang="fr-FR"/>
           </a:p>
@@ -867,9 +1226,9 @@
           <a:bodyPr/>
           <a:lstStyle/>
           <a:p>
-            <a:fld id="{B772CE12-9C45-42A3-8B94-7DA904E53F03}" type="datetimeFigureOut">
+            <a:fld id="{B21E7010-4D3E-4C28-99D1-136D20F29935}" type="datetime1">
               <a:rPr lang="fr-FR" smtClean="0"/>
-              <a:t>05/05/2023</a:t>
+              <a:t>10/05/2023</a:t>
             </a:fld>
             <a:endParaRPr lang="fr-FR"/>
           </a:p>
@@ -1142,9 +1501,9 @@
           <a:bodyPr/>
           <a:lstStyle/>
           <a:p>
-            <a:fld id="{B772CE12-9C45-42A3-8B94-7DA904E53F03}" type="datetimeFigureOut">
+            <a:fld id="{DC8AEB5F-CEBF-46C3-B1AE-F989DF7EF13B}" type="datetime1">
               <a:rPr lang="fr-FR" smtClean="0"/>
-              <a:t>05/05/2023</a:t>
+              <a:t>10/05/2023</a:t>
             </a:fld>
             <a:endParaRPr lang="fr-FR"/>
           </a:p>
@@ -1407,9 +1766,9 @@
           <a:bodyPr/>
           <a:lstStyle/>
           <a:p>
-            <a:fld id="{B772CE12-9C45-42A3-8B94-7DA904E53F03}" type="datetimeFigureOut">
+            <a:fld id="{04605D90-FE22-4529-BF52-994494BAE5AE}" type="datetime1">
               <a:rPr lang="fr-FR" smtClean="0"/>
-              <a:t>05/05/2023</a:t>
+              <a:t>10/05/2023</a:t>
             </a:fld>
             <a:endParaRPr lang="fr-FR"/>
           </a:p>
@@ -1819,9 +2178,9 @@
           <a:bodyPr/>
           <a:lstStyle/>
           <a:p>
-            <a:fld id="{B772CE12-9C45-42A3-8B94-7DA904E53F03}" type="datetimeFigureOut">
+            <a:fld id="{FD955FD7-45C3-4129-B02E-3046546EA5D1}" type="datetime1">
               <a:rPr lang="fr-FR" smtClean="0"/>
-              <a:t>05/05/2023</a:t>
+              <a:t>10/05/2023</a:t>
             </a:fld>
             <a:endParaRPr lang="fr-FR"/>
           </a:p>
@@ -1960,9 +2319,9 @@
           <a:bodyPr/>
           <a:lstStyle/>
           <a:p>
-            <a:fld id="{B772CE12-9C45-42A3-8B94-7DA904E53F03}" type="datetimeFigureOut">
+            <a:fld id="{6F797003-0BCB-4593-B2B4-6F01BEFD3932}" type="datetime1">
               <a:rPr lang="fr-FR" smtClean="0"/>
-              <a:t>05/05/2023</a:t>
+              <a:t>10/05/2023</a:t>
             </a:fld>
             <a:endParaRPr lang="fr-FR"/>
           </a:p>
@@ -2073,9 +2432,9 @@
           <a:bodyPr/>
           <a:lstStyle/>
           <a:p>
-            <a:fld id="{B772CE12-9C45-42A3-8B94-7DA904E53F03}" type="datetimeFigureOut">
+            <a:fld id="{C9BF9042-B0B5-4262-800E-FA2DFD129415}" type="datetime1">
               <a:rPr lang="fr-FR" smtClean="0"/>
-              <a:t>05/05/2023</a:t>
+              <a:t>10/05/2023</a:t>
             </a:fld>
             <a:endParaRPr lang="fr-FR"/>
           </a:p>
@@ -2384,9 +2743,9 @@
           <a:bodyPr/>
           <a:lstStyle/>
           <a:p>
-            <a:fld id="{B772CE12-9C45-42A3-8B94-7DA904E53F03}" type="datetimeFigureOut">
+            <a:fld id="{5E85A208-46B0-467D-B50B-FE3A10B64B71}" type="datetime1">
               <a:rPr lang="fr-FR" smtClean="0"/>
-              <a:t>05/05/2023</a:t>
+              <a:t>10/05/2023</a:t>
             </a:fld>
             <a:endParaRPr lang="fr-FR"/>
           </a:p>
@@ -2672,9 +3031,9 @@
           <a:bodyPr/>
           <a:lstStyle/>
           <a:p>
-            <a:fld id="{B772CE12-9C45-42A3-8B94-7DA904E53F03}" type="datetimeFigureOut">
+            <a:fld id="{9E5075F3-56BA-4ED8-81AA-401C7E9790B9}" type="datetime1">
               <a:rPr lang="fr-FR" smtClean="0"/>
-              <a:t>05/05/2023</a:t>
+              <a:t>10/05/2023</a:t>
             </a:fld>
             <a:endParaRPr lang="fr-FR"/>
           </a:p>
@@ -2913,9 +3272,9 @@
             </a:lvl1pPr>
           </a:lstStyle>
           <a:p>
-            <a:fld id="{B772CE12-9C45-42A3-8B94-7DA904E53F03}" type="datetimeFigureOut">
+            <a:fld id="{F2E562FB-9694-4368-A66B-7C2F397C5163}" type="datetime1">
               <a:rPr lang="fr-FR" smtClean="0"/>
-              <a:t>05/05/2023</a:t>
+              <a:t>10/05/2023</a:t>
             </a:fld>
             <a:endParaRPr lang="fr-FR"/>
           </a:p>
@@ -3032,6 +3391,7 @@
     <p:sldLayoutId id="2147483658" r:id="rId10"/>
     <p:sldLayoutId id="2147483659" r:id="rId11"/>
   </p:sldLayoutIdLst>
+  <p:hf hdr="0" ftr="0"/>
   <p:txStyles>
     <p:titleStyle>
       <a:lvl1pPr algn="l" defTabSz="914400" rtl="0" eaLnBrk="1" latinLnBrk="0" hangingPunct="1">
@@ -3491,6 +3851,64 @@
           </a:prstGeom>
         </p:spPr>
       </p:pic>
+      <p:sp>
+        <p:nvSpPr>
+          <p:cNvPr id="2" name="Espace réservé de la date 1">
+            <a:extLst>
+              <a:ext uri="{FF2B5EF4-FFF2-40B4-BE49-F238E27FC236}">
+                <a16:creationId xmlns:a16="http://schemas.microsoft.com/office/drawing/2014/main" id="{CD896E27-61CD-FDF0-5BFD-192A595B3440}"/>
+              </a:ext>
+            </a:extLst>
+          </p:cNvPr>
+          <p:cNvSpPr>
+            <a:spLocks noGrp="1"/>
+          </p:cNvSpPr>
+          <p:nvPr>
+            <p:ph type="dt" sz="half" idx="10"/>
+          </p:nvPr>
+        </p:nvSpPr>
+        <p:spPr/>
+        <p:txBody>
+          <a:bodyPr/>
+          <a:lstStyle/>
+          <a:p>
+            <a:fld id="{558FCFB5-0C95-44C7-B31B-CD8A7B1B23CA}" type="datetime1">
+              <a:rPr lang="fr-FR" smtClean="0"/>
+              <a:t>10/05/2023</a:t>
+            </a:fld>
+            <a:endParaRPr lang="fr-FR"/>
+          </a:p>
+        </p:txBody>
+      </p:sp>
+      <p:sp>
+        <p:nvSpPr>
+          <p:cNvPr id="3" name="Espace réservé du numéro de diapositive 2">
+            <a:extLst>
+              <a:ext uri="{FF2B5EF4-FFF2-40B4-BE49-F238E27FC236}">
+                <a16:creationId xmlns:a16="http://schemas.microsoft.com/office/drawing/2014/main" id="{7481BCC5-CDB2-241E-B9A2-E4441B0D41B8}"/>
+              </a:ext>
+            </a:extLst>
+          </p:cNvPr>
+          <p:cNvSpPr>
+            <a:spLocks noGrp="1"/>
+          </p:cNvSpPr>
+          <p:nvPr>
+            <p:ph type="sldNum" sz="quarter" idx="12"/>
+          </p:nvPr>
+        </p:nvSpPr>
+        <p:spPr/>
+        <p:txBody>
+          <a:bodyPr/>
+          <a:lstStyle/>
+          <a:p>
+            <a:fld id="{95C870F5-2469-49EC-A44E-C9B5362F8607}" type="slidenum">
+              <a:rPr lang="fr-FR" smtClean="0"/>
+              <a:t>1</a:t>
+            </a:fld>
+            <a:endParaRPr lang="fr-FR"/>
+          </a:p>
+        </p:txBody>
+      </p:sp>
     </p:spTree>
     <p:extLst>
       <p:ext uri="{BB962C8B-B14F-4D97-AF65-F5344CB8AC3E}">
@@ -3885,6 +4303,64 @@
           </a:prstGeom>
         </p:spPr>
       </p:pic>
+      <p:sp>
+        <p:nvSpPr>
+          <p:cNvPr id="9" name="Espace réservé de la date 8">
+            <a:extLst>
+              <a:ext uri="{FF2B5EF4-FFF2-40B4-BE49-F238E27FC236}">
+                <a16:creationId xmlns:a16="http://schemas.microsoft.com/office/drawing/2014/main" id="{969355F7-3474-7D2F-4F70-FBD0999B498C}"/>
+              </a:ext>
+            </a:extLst>
+          </p:cNvPr>
+          <p:cNvSpPr>
+            <a:spLocks noGrp="1"/>
+          </p:cNvSpPr>
+          <p:nvPr>
+            <p:ph type="dt" sz="half" idx="10"/>
+          </p:nvPr>
+        </p:nvSpPr>
+        <p:spPr/>
+        <p:txBody>
+          <a:bodyPr/>
+          <a:lstStyle/>
+          <a:p>
+            <a:fld id="{21485B03-718B-45F7-95FB-A971DFD54B9D}" type="datetime1">
+              <a:rPr lang="fr-FR" smtClean="0"/>
+              <a:t>10/05/2023</a:t>
+            </a:fld>
+            <a:endParaRPr lang="fr-FR"/>
+          </a:p>
+        </p:txBody>
+      </p:sp>
+      <p:sp>
+        <p:nvSpPr>
+          <p:cNvPr id="11" name="Espace réservé du numéro de diapositive 10">
+            <a:extLst>
+              <a:ext uri="{FF2B5EF4-FFF2-40B4-BE49-F238E27FC236}">
+                <a16:creationId xmlns:a16="http://schemas.microsoft.com/office/drawing/2014/main" id="{5ED12286-7F76-81A6-7B9E-E094C7C70384}"/>
+              </a:ext>
+            </a:extLst>
+          </p:cNvPr>
+          <p:cNvSpPr>
+            <a:spLocks noGrp="1"/>
+          </p:cNvSpPr>
+          <p:nvPr>
+            <p:ph type="sldNum" sz="quarter" idx="12"/>
+          </p:nvPr>
+        </p:nvSpPr>
+        <p:spPr/>
+        <p:txBody>
+          <a:bodyPr/>
+          <a:lstStyle/>
+          <a:p>
+            <a:fld id="{95C870F5-2469-49EC-A44E-C9B5362F8607}" type="slidenum">
+              <a:rPr lang="fr-FR" smtClean="0"/>
+              <a:t>10</a:t>
+            </a:fld>
+            <a:endParaRPr lang="fr-FR"/>
+          </a:p>
+        </p:txBody>
+      </p:sp>
     </p:spTree>
     <p:extLst>
       <p:ext uri="{BB962C8B-B14F-4D97-AF65-F5344CB8AC3E}">
@@ -3899,6 +4375,987 @@
 </file>
 
 <file path=ppt/slides/slide11.xml><?xml version="1.0" encoding="utf-8"?>
+<p:sld xmlns:a="http://schemas.openxmlformats.org/drawingml/2006/main" xmlns:r="http://schemas.openxmlformats.org/officeDocument/2006/relationships" xmlns:p="http://schemas.openxmlformats.org/presentationml/2006/main">
+  <p:cSld>
+    <p:spTree>
+      <p:nvGrpSpPr>
+        <p:cNvPr id="1" name=""/>
+        <p:cNvGrpSpPr/>
+        <p:nvPr/>
+      </p:nvGrpSpPr>
+      <p:grpSpPr>
+        <a:xfrm>
+          <a:off x="0" y="0"/>
+          <a:ext cx="0" cy="0"/>
+          <a:chOff x="0" y="0"/>
+          <a:chExt cx="0" cy="0"/>
+        </a:xfrm>
+      </p:grpSpPr>
+      <p:pic>
+        <p:nvPicPr>
+          <p:cNvPr id="7" name="Espace réservé du contenu 6" descr="Une image contenant texte, Appareils électroniques, ordinateur, affichage&#10;&#10;Description générée automatiquement">
+            <a:extLst>
+              <a:ext uri="{FF2B5EF4-FFF2-40B4-BE49-F238E27FC236}">
+                <a16:creationId xmlns:a16="http://schemas.microsoft.com/office/drawing/2014/main" id="{35E1504E-D47D-97EC-E9D5-C1F90725BFEC}"/>
+              </a:ext>
+            </a:extLst>
+          </p:cNvPr>
+          <p:cNvPicPr>
+            <a:picLocks noGrp="1" noChangeAspect="1"/>
+          </p:cNvPicPr>
+          <p:nvPr>
+            <p:ph idx="1"/>
+          </p:nvPr>
+        </p:nvPicPr>
+        <p:blipFill>
+          <a:blip r:embed="rId2">
+            <a:extLst>
+              <a:ext uri="{28A0092B-C50C-407E-A947-70E740481C1C}">
+                <a14:useLocalDpi xmlns:a14="http://schemas.microsoft.com/office/drawing/2010/main" val="0"/>
+              </a:ext>
+            </a:extLst>
+          </a:blip>
+          <a:stretch>
+            <a:fillRect/>
+          </a:stretch>
+        </p:blipFill>
+        <p:spPr>
+          <a:xfrm>
+            <a:off x="0" y="0"/>
+            <a:ext cx="12192000" cy="6858000"/>
+          </a:xfrm>
+        </p:spPr>
+      </p:pic>
+      <p:sp>
+        <p:nvSpPr>
+          <p:cNvPr id="4" name="Espace réservé de la date 3">
+            <a:extLst>
+              <a:ext uri="{FF2B5EF4-FFF2-40B4-BE49-F238E27FC236}">
+                <a16:creationId xmlns:a16="http://schemas.microsoft.com/office/drawing/2014/main" id="{8118D3AF-A5D7-F11C-CC4A-52531E3863AE}"/>
+              </a:ext>
+            </a:extLst>
+          </p:cNvPr>
+          <p:cNvSpPr>
+            <a:spLocks noGrp="1"/>
+          </p:cNvSpPr>
+          <p:nvPr>
+            <p:ph type="dt" sz="half" idx="10"/>
+          </p:nvPr>
+        </p:nvSpPr>
+        <p:spPr/>
+        <p:txBody>
+          <a:bodyPr/>
+          <a:lstStyle/>
+          <a:p>
+            <a:fld id="{B21E7010-4D3E-4C28-99D1-136D20F29935}" type="datetime1">
+              <a:rPr lang="fr-FR" smtClean="0"/>
+              <a:t>10/05/2023</a:t>
+            </a:fld>
+            <a:endParaRPr lang="fr-FR"/>
+          </a:p>
+        </p:txBody>
+      </p:sp>
+      <p:sp>
+        <p:nvSpPr>
+          <p:cNvPr id="5" name="Espace réservé du numéro de diapositive 4">
+            <a:extLst>
+              <a:ext uri="{FF2B5EF4-FFF2-40B4-BE49-F238E27FC236}">
+                <a16:creationId xmlns:a16="http://schemas.microsoft.com/office/drawing/2014/main" id="{FF3D7B75-E1EE-FF34-07E5-BE0E40A453D5}"/>
+              </a:ext>
+            </a:extLst>
+          </p:cNvPr>
+          <p:cNvSpPr>
+            <a:spLocks noGrp="1"/>
+          </p:cNvSpPr>
+          <p:nvPr>
+            <p:ph type="sldNum" sz="quarter" idx="12"/>
+          </p:nvPr>
+        </p:nvSpPr>
+        <p:spPr/>
+        <p:txBody>
+          <a:bodyPr/>
+          <a:lstStyle/>
+          <a:p>
+            <a:fld id="{95C870F5-2469-49EC-A44E-C9B5362F8607}" type="slidenum">
+              <a:rPr lang="fr-FR" smtClean="0"/>
+              <a:t>11</a:t>
+            </a:fld>
+            <a:endParaRPr lang="fr-FR"/>
+          </a:p>
+        </p:txBody>
+      </p:sp>
+      <p:pic>
+        <p:nvPicPr>
+          <p:cNvPr id="11" name="Image 10">
+            <a:extLst>
+              <a:ext uri="{FF2B5EF4-FFF2-40B4-BE49-F238E27FC236}">
+                <a16:creationId xmlns:a16="http://schemas.microsoft.com/office/drawing/2014/main" id="{5FF1BF5A-1EB2-ED51-1A00-9F9ED715879E}"/>
+              </a:ext>
+            </a:extLst>
+          </p:cNvPr>
+          <p:cNvPicPr>
+            <a:picLocks noChangeAspect="1"/>
+          </p:cNvPicPr>
+          <p:nvPr/>
+        </p:nvPicPr>
+        <p:blipFill rotWithShape="1">
+          <a:blip r:embed="rId3">
+            <a:extLst>
+              <a:ext uri="{28A0092B-C50C-407E-A947-70E740481C1C}">
+                <a14:useLocalDpi xmlns:a14="http://schemas.microsoft.com/office/drawing/2010/main" val="0"/>
+              </a:ext>
+            </a:extLst>
+          </a:blip>
+          <a:srcRect l="12364" t="17353" r="16487" b="16919"/>
+          <a:stretch/>
+        </p:blipFill>
+        <p:spPr>
+          <a:xfrm>
+            <a:off x="9393382" y="3253510"/>
+            <a:ext cx="1357744" cy="1254258"/>
+          </a:xfrm>
+          <a:prstGeom prst="roundRect">
+            <a:avLst>
+              <a:gd name="adj" fmla="val 16667"/>
+            </a:avLst>
+          </a:prstGeom>
+          <a:ln>
+            <a:noFill/>
+          </a:ln>
+          <a:effectLst>
+            <a:outerShdw blurRad="76200" dist="38100" dir="7800000" algn="tl" rotWithShape="0">
+              <a:srgbClr val="000000">
+                <a:alpha val="40000"/>
+              </a:srgbClr>
+            </a:outerShdw>
+          </a:effectLst>
+          <a:scene3d>
+            <a:camera prst="orthographicFront"/>
+            <a:lightRig rig="contrasting" dir="t">
+              <a:rot lat="0" lon="0" rev="4200000"/>
+            </a:lightRig>
+          </a:scene3d>
+          <a:sp3d prstMaterial="plastic">
+            <a:bevelT w="381000" h="114300" prst="relaxedInset"/>
+            <a:contourClr>
+              <a:srgbClr val="969696"/>
+            </a:contourClr>
+          </a:sp3d>
+        </p:spPr>
+      </p:pic>
+      <p:sp>
+        <p:nvSpPr>
+          <p:cNvPr id="12" name="Flèche : bas 11">
+            <a:extLst>
+              <a:ext uri="{FF2B5EF4-FFF2-40B4-BE49-F238E27FC236}">
+                <a16:creationId xmlns:a16="http://schemas.microsoft.com/office/drawing/2014/main" id="{BCD6D6BF-9FBD-F533-D0F4-1AAD966E0A02}"/>
+              </a:ext>
+            </a:extLst>
+          </p:cNvPr>
+          <p:cNvSpPr/>
+          <p:nvPr/>
+        </p:nvSpPr>
+        <p:spPr>
+          <a:xfrm rot="16200000">
+            <a:off x="11229247" y="3391435"/>
+            <a:ext cx="484632" cy="978408"/>
+          </a:xfrm>
+          <a:prstGeom prst="downArrow">
+            <a:avLst/>
+          </a:prstGeom>
+          <a:solidFill>
+            <a:srgbClr val="FFC000"/>
+          </a:solidFill>
+        </p:spPr>
+        <p:style>
+          <a:lnRef idx="2">
+            <a:schemeClr val="accent1">
+              <a:shade val="50000"/>
+            </a:schemeClr>
+          </a:lnRef>
+          <a:fillRef idx="1">
+            <a:schemeClr val="accent1"/>
+          </a:fillRef>
+          <a:effectRef idx="0">
+            <a:schemeClr val="accent1"/>
+          </a:effectRef>
+          <a:fontRef idx="minor">
+            <a:schemeClr val="lt1"/>
+          </a:fontRef>
+        </p:style>
+        <p:txBody>
+          <a:bodyPr rtlCol="0" anchor="ctr"/>
+          <a:lstStyle/>
+          <a:p>
+            <a:pPr algn="ctr"/>
+            <a:endParaRPr lang="fr-FR"/>
+          </a:p>
+        </p:txBody>
+      </p:sp>
+    </p:spTree>
+    <p:extLst>
+      <p:ext uri="{BB962C8B-B14F-4D97-AF65-F5344CB8AC3E}">
+        <p14:creationId xmlns:p14="http://schemas.microsoft.com/office/powerpoint/2010/main" val="3070389817"/>
+      </p:ext>
+    </p:extLst>
+  </p:cSld>
+  <p:clrMapOvr>
+    <a:masterClrMapping/>
+  </p:clrMapOvr>
+</p:sld>
+</file>
+
+<file path=ppt/slides/slide12.xml><?xml version="1.0" encoding="utf-8"?>
+<p:sld xmlns:a="http://schemas.openxmlformats.org/drawingml/2006/main" xmlns:r="http://schemas.openxmlformats.org/officeDocument/2006/relationships" xmlns:p="http://schemas.openxmlformats.org/presentationml/2006/main">
+  <p:cSld>
+    <p:spTree>
+      <p:nvGrpSpPr>
+        <p:cNvPr id="1" name=""/>
+        <p:cNvGrpSpPr/>
+        <p:nvPr/>
+      </p:nvGrpSpPr>
+      <p:grpSpPr>
+        <a:xfrm>
+          <a:off x="0" y="0"/>
+          <a:ext cx="0" cy="0"/>
+          <a:chOff x="0" y="0"/>
+          <a:chExt cx="0" cy="0"/>
+        </a:xfrm>
+      </p:grpSpPr>
+      <p:pic>
+        <p:nvPicPr>
+          <p:cNvPr id="5" name="Image 4">
+            <a:extLst>
+              <a:ext uri="{FF2B5EF4-FFF2-40B4-BE49-F238E27FC236}">
+                <a16:creationId xmlns:a16="http://schemas.microsoft.com/office/drawing/2014/main" id="{EF624D9C-C577-A0C7-3440-9A807E6014A9}"/>
+              </a:ext>
+            </a:extLst>
+          </p:cNvPr>
+          <p:cNvPicPr>
+            <a:picLocks noChangeAspect="1"/>
+          </p:cNvPicPr>
+          <p:nvPr/>
+        </p:nvPicPr>
+        <p:blipFill>
+          <a:blip r:embed="rId2"/>
+          <a:stretch>
+            <a:fillRect/>
+          </a:stretch>
+        </p:blipFill>
+        <p:spPr>
+          <a:xfrm>
+            <a:off x="77097" y="135183"/>
+            <a:ext cx="1697852" cy="927305"/>
+          </a:xfrm>
+          <a:prstGeom prst="rect">
+            <a:avLst/>
+          </a:prstGeom>
+        </p:spPr>
+      </p:pic>
+      <p:sp>
+        <p:nvSpPr>
+          <p:cNvPr id="2" name="ZoneTexte 1">
+            <a:extLst>
+              <a:ext uri="{FF2B5EF4-FFF2-40B4-BE49-F238E27FC236}">
+                <a16:creationId xmlns:a16="http://schemas.microsoft.com/office/drawing/2014/main" id="{6514947F-4A22-05F9-B790-1140CD357803}"/>
+              </a:ext>
+            </a:extLst>
+          </p:cNvPr>
+          <p:cNvSpPr txBox="1"/>
+          <p:nvPr/>
+        </p:nvSpPr>
+        <p:spPr>
+          <a:xfrm>
+            <a:off x="2266160" y="2829464"/>
+            <a:ext cx="45719" cy="369332"/>
+          </a:xfrm>
+          <a:prstGeom prst="rect">
+            <a:avLst/>
+          </a:prstGeom>
+          <a:noFill/>
+        </p:spPr>
+        <p:txBody>
+          <a:bodyPr wrap="square" rtlCol="0">
+            <a:spAutoFit/>
+          </a:bodyPr>
+          <a:lstStyle/>
+          <a:p>
+            <a:pPr marL="0" marR="0" lvl="0" indent="0" algn="l" defTabSz="914400" rtl="0" eaLnBrk="1" fontAlgn="auto" latinLnBrk="0" hangingPunct="1">
+              <a:lnSpc>
+                <a:spcPct val="100000"/>
+              </a:lnSpc>
+              <a:spcBef>
+                <a:spcPts val="0"/>
+              </a:spcBef>
+              <a:spcAft>
+                <a:spcPts val="0"/>
+              </a:spcAft>
+              <a:buClrTx/>
+              <a:buSzTx/>
+              <a:buFontTx/>
+              <a:buNone/>
+              <a:tabLst/>
+              <a:defRPr/>
+            </a:pPr>
+            <a:endParaRPr kumimoji="0" lang="fr-FR" sz="1800" b="0" i="0" u="none" strike="noStrike" kern="1200" cap="none" spc="0" normalizeH="0" baseline="0" noProof="0" dirty="0">
+              <a:ln>
+                <a:noFill/>
+              </a:ln>
+              <a:solidFill>
+                <a:prstClr val="black"/>
+              </a:solidFill>
+              <a:effectLst/>
+              <a:uLnTx/>
+              <a:uFillTx/>
+              <a:latin typeface="Calibri" panose="020F0502020204030204"/>
+              <a:ea typeface="+mn-ea"/>
+              <a:cs typeface="+mn-cs"/>
+            </a:endParaRPr>
+          </a:p>
+        </p:txBody>
+      </p:sp>
+      <p:pic>
+        <p:nvPicPr>
+          <p:cNvPr id="10" name="Image 9" descr="Une image contenant texte, clipart&#10;&#10;Description générée automatiquement">
+            <a:extLst>
+              <a:ext uri="{FF2B5EF4-FFF2-40B4-BE49-F238E27FC236}">
+                <a16:creationId xmlns:a16="http://schemas.microsoft.com/office/drawing/2014/main" id="{88C52C98-E356-CAA9-AE51-B298483B8C58}"/>
+              </a:ext>
+            </a:extLst>
+          </p:cNvPr>
+          <p:cNvPicPr>
+            <a:picLocks noChangeAspect="1"/>
+          </p:cNvPicPr>
+          <p:nvPr/>
+        </p:nvPicPr>
+        <p:blipFill>
+          <a:blip r:embed="rId3">
+            <a:extLst>
+              <a:ext uri="{28A0092B-C50C-407E-A947-70E740481C1C}">
+                <a14:useLocalDpi xmlns:a14="http://schemas.microsoft.com/office/drawing/2010/main" val="0"/>
+              </a:ext>
+            </a:extLst>
+          </a:blip>
+          <a:stretch>
+            <a:fillRect/>
+          </a:stretch>
+        </p:blipFill>
+        <p:spPr>
+          <a:xfrm>
+            <a:off x="9203113" y="261692"/>
+            <a:ext cx="2619886" cy="802138"/>
+          </a:xfrm>
+          <a:prstGeom prst="rect">
+            <a:avLst/>
+          </a:prstGeom>
+        </p:spPr>
+      </p:pic>
+      <p:sp>
+        <p:nvSpPr>
+          <p:cNvPr id="9" name="Espace réservé de la date 8">
+            <a:extLst>
+              <a:ext uri="{FF2B5EF4-FFF2-40B4-BE49-F238E27FC236}">
+                <a16:creationId xmlns:a16="http://schemas.microsoft.com/office/drawing/2014/main" id="{969355F7-3474-7D2F-4F70-FBD0999B498C}"/>
+              </a:ext>
+            </a:extLst>
+          </p:cNvPr>
+          <p:cNvSpPr>
+            <a:spLocks noGrp="1"/>
+          </p:cNvSpPr>
+          <p:nvPr>
+            <p:ph type="dt" sz="half" idx="10"/>
+          </p:nvPr>
+        </p:nvSpPr>
+        <p:spPr/>
+        <p:txBody>
+          <a:bodyPr/>
+          <a:lstStyle/>
+          <a:p>
+            <a:pPr marL="0" marR="0" lvl="0" indent="0" algn="l" defTabSz="914400" rtl="0" eaLnBrk="1" fontAlgn="auto" latinLnBrk="0" hangingPunct="1">
+              <a:lnSpc>
+                <a:spcPct val="100000"/>
+              </a:lnSpc>
+              <a:spcBef>
+                <a:spcPts val="0"/>
+              </a:spcBef>
+              <a:spcAft>
+                <a:spcPts val="0"/>
+              </a:spcAft>
+              <a:buClrTx/>
+              <a:buSzTx/>
+              <a:buFontTx/>
+              <a:buNone/>
+              <a:tabLst/>
+              <a:defRPr/>
+            </a:pPr>
+            <a:fld id="{21485B03-718B-45F7-95FB-A971DFD54B9D}" type="datetime1">
+              <a:rPr kumimoji="0" lang="fr-FR" sz="1200" b="0" i="0" u="none" strike="noStrike" kern="1200" cap="none" spc="0" normalizeH="0" baseline="0" noProof="0" smtClean="0">
+                <a:ln>
+                  <a:noFill/>
+                </a:ln>
+                <a:solidFill>
+                  <a:prstClr val="black">
+                    <a:tint val="75000"/>
+                  </a:prstClr>
+                </a:solidFill>
+                <a:effectLst/>
+                <a:uLnTx/>
+                <a:uFillTx/>
+                <a:latin typeface="Calibri" panose="020F0502020204030204"/>
+                <a:ea typeface="+mn-ea"/>
+                <a:cs typeface="+mn-cs"/>
+              </a:rPr>
+              <a:pPr marL="0" marR="0" lvl="0" indent="0" algn="l" defTabSz="914400" rtl="0" eaLnBrk="1" fontAlgn="auto" latinLnBrk="0" hangingPunct="1">
+                <a:lnSpc>
+                  <a:spcPct val="100000"/>
+                </a:lnSpc>
+                <a:spcBef>
+                  <a:spcPts val="0"/>
+                </a:spcBef>
+                <a:spcAft>
+                  <a:spcPts val="0"/>
+                </a:spcAft>
+                <a:buClrTx/>
+                <a:buSzTx/>
+                <a:buFontTx/>
+                <a:buNone/>
+                <a:tabLst/>
+                <a:defRPr/>
+              </a:pPr>
+              <a:t>10/05/2023</a:t>
+            </a:fld>
+            <a:endParaRPr kumimoji="0" lang="fr-FR" sz="1200" b="0" i="0" u="none" strike="noStrike" kern="1200" cap="none" spc="0" normalizeH="0" baseline="0" noProof="0">
+              <a:ln>
+                <a:noFill/>
+              </a:ln>
+              <a:solidFill>
+                <a:prstClr val="black">
+                  <a:tint val="75000"/>
+                </a:prstClr>
+              </a:solidFill>
+              <a:effectLst/>
+              <a:uLnTx/>
+              <a:uFillTx/>
+              <a:latin typeface="Calibri" panose="020F0502020204030204"/>
+              <a:ea typeface="+mn-ea"/>
+              <a:cs typeface="+mn-cs"/>
+            </a:endParaRPr>
+          </a:p>
+        </p:txBody>
+      </p:sp>
+      <p:sp>
+        <p:nvSpPr>
+          <p:cNvPr id="11" name="Espace réservé du numéro de diapositive 10">
+            <a:extLst>
+              <a:ext uri="{FF2B5EF4-FFF2-40B4-BE49-F238E27FC236}">
+                <a16:creationId xmlns:a16="http://schemas.microsoft.com/office/drawing/2014/main" id="{5ED12286-7F76-81A6-7B9E-E094C7C70384}"/>
+              </a:ext>
+            </a:extLst>
+          </p:cNvPr>
+          <p:cNvSpPr>
+            <a:spLocks noGrp="1"/>
+          </p:cNvSpPr>
+          <p:nvPr>
+            <p:ph type="sldNum" sz="quarter" idx="12"/>
+          </p:nvPr>
+        </p:nvSpPr>
+        <p:spPr/>
+        <p:txBody>
+          <a:bodyPr/>
+          <a:lstStyle/>
+          <a:p>
+            <a:pPr marL="0" marR="0" lvl="0" indent="0" algn="r" defTabSz="914400" rtl="0" eaLnBrk="1" fontAlgn="auto" latinLnBrk="0" hangingPunct="1">
+              <a:lnSpc>
+                <a:spcPct val="100000"/>
+              </a:lnSpc>
+              <a:spcBef>
+                <a:spcPts val="0"/>
+              </a:spcBef>
+              <a:spcAft>
+                <a:spcPts val="0"/>
+              </a:spcAft>
+              <a:buClrTx/>
+              <a:buSzTx/>
+              <a:buFontTx/>
+              <a:buNone/>
+              <a:tabLst/>
+              <a:defRPr/>
+            </a:pPr>
+            <a:fld id="{95C870F5-2469-49EC-A44E-C9B5362F8607}" type="slidenum">
+              <a:rPr kumimoji="0" lang="fr-FR" sz="1200" b="0" i="0" u="none" strike="noStrike" kern="1200" cap="none" spc="0" normalizeH="0" baseline="0" noProof="0" smtClean="0">
+                <a:ln>
+                  <a:noFill/>
+                </a:ln>
+                <a:solidFill>
+                  <a:prstClr val="black">
+                    <a:tint val="75000"/>
+                  </a:prstClr>
+                </a:solidFill>
+                <a:effectLst/>
+                <a:uLnTx/>
+                <a:uFillTx/>
+                <a:latin typeface="Calibri" panose="020F0502020204030204"/>
+                <a:ea typeface="+mn-ea"/>
+                <a:cs typeface="+mn-cs"/>
+              </a:rPr>
+              <a:pPr marL="0" marR="0" lvl="0" indent="0" algn="r" defTabSz="914400" rtl="0" eaLnBrk="1" fontAlgn="auto" latinLnBrk="0" hangingPunct="1">
+                <a:lnSpc>
+                  <a:spcPct val="100000"/>
+                </a:lnSpc>
+                <a:spcBef>
+                  <a:spcPts val="0"/>
+                </a:spcBef>
+                <a:spcAft>
+                  <a:spcPts val="0"/>
+                </a:spcAft>
+                <a:buClrTx/>
+                <a:buSzTx/>
+                <a:buFontTx/>
+                <a:buNone/>
+                <a:tabLst/>
+                <a:defRPr/>
+              </a:pPr>
+              <a:t>12</a:t>
+            </a:fld>
+            <a:endParaRPr kumimoji="0" lang="fr-FR" sz="1200" b="0" i="0" u="none" strike="noStrike" kern="1200" cap="none" spc="0" normalizeH="0" baseline="0" noProof="0">
+              <a:ln>
+                <a:noFill/>
+              </a:ln>
+              <a:solidFill>
+                <a:prstClr val="black">
+                  <a:tint val="75000"/>
+                </a:prstClr>
+              </a:solidFill>
+              <a:effectLst/>
+              <a:uLnTx/>
+              <a:uFillTx/>
+              <a:latin typeface="Calibri" panose="020F0502020204030204"/>
+              <a:ea typeface="+mn-ea"/>
+              <a:cs typeface="+mn-cs"/>
+            </a:endParaRPr>
+          </a:p>
+        </p:txBody>
+      </p:sp>
+      <p:pic>
+        <p:nvPicPr>
+          <p:cNvPr id="19" name="Image 18" descr="Une image contenant texte&#10;&#10;Description générée automatiquement">
+            <a:extLst>
+              <a:ext uri="{FF2B5EF4-FFF2-40B4-BE49-F238E27FC236}">
+                <a16:creationId xmlns:a16="http://schemas.microsoft.com/office/drawing/2014/main" id="{F04CE2E3-D08D-B125-32FF-C45CE7FE02F7}"/>
+              </a:ext>
+            </a:extLst>
+          </p:cNvPr>
+          <p:cNvPicPr>
+            <a:picLocks noChangeAspect="1"/>
+          </p:cNvPicPr>
+          <p:nvPr/>
+        </p:nvPicPr>
+        <p:blipFill>
+          <a:blip r:embed="rId4">
+            <a:extLst>
+              <a:ext uri="{28A0092B-C50C-407E-A947-70E740481C1C}">
+                <a14:useLocalDpi xmlns:a14="http://schemas.microsoft.com/office/drawing/2010/main" val="0"/>
+              </a:ext>
+            </a:extLst>
+          </a:blip>
+          <a:stretch>
+            <a:fillRect/>
+          </a:stretch>
+        </p:blipFill>
+        <p:spPr>
+          <a:xfrm>
+            <a:off x="9103343" y="4508242"/>
+            <a:ext cx="2581635" cy="1848108"/>
+          </a:xfrm>
+          <a:prstGeom prst="roundRect">
+            <a:avLst>
+              <a:gd name="adj" fmla="val 4167"/>
+            </a:avLst>
+          </a:prstGeom>
+          <a:solidFill>
+            <a:srgbClr val="FFFFFF"/>
+          </a:solidFill>
+          <a:ln w="76200" cap="sq">
+            <a:solidFill>
+              <a:srgbClr val="292929"/>
+            </a:solidFill>
+            <a:miter lim="800000"/>
+          </a:ln>
+          <a:effectLst>
+            <a:reflection blurRad="12700" stA="28000" endPos="28000" dist="5000" dir="5400000" sy="-100000" algn="bl" rotWithShape="0"/>
+          </a:effectLst>
+          <a:scene3d>
+            <a:camera prst="orthographicFront"/>
+            <a:lightRig rig="threePt" dir="t">
+              <a:rot lat="0" lon="0" rev="2700000"/>
+            </a:lightRig>
+          </a:scene3d>
+          <a:sp3d>
+            <a:bevelT h="38100"/>
+            <a:contourClr>
+              <a:srgbClr val="C0C0C0"/>
+            </a:contourClr>
+          </a:sp3d>
+        </p:spPr>
+      </p:pic>
+      <p:pic>
+        <p:nvPicPr>
+          <p:cNvPr id="21" name="Image 20" descr="Une image contenant texte&#10;&#10;Description générée automatiquement">
+            <a:extLst>
+              <a:ext uri="{FF2B5EF4-FFF2-40B4-BE49-F238E27FC236}">
+                <a16:creationId xmlns:a16="http://schemas.microsoft.com/office/drawing/2014/main" id="{E5501D67-DD0D-977C-F8B3-09930106482C}"/>
+              </a:ext>
+            </a:extLst>
+          </p:cNvPr>
+          <p:cNvPicPr>
+            <a:picLocks noChangeAspect="1"/>
+          </p:cNvPicPr>
+          <p:nvPr/>
+        </p:nvPicPr>
+        <p:blipFill>
+          <a:blip r:embed="rId5">
+            <a:extLst>
+              <a:ext uri="{28A0092B-C50C-407E-A947-70E740481C1C}">
+                <a14:useLocalDpi xmlns:a14="http://schemas.microsoft.com/office/drawing/2010/main" val="0"/>
+              </a:ext>
+            </a:extLst>
+          </a:blip>
+          <a:stretch>
+            <a:fillRect/>
+          </a:stretch>
+        </p:blipFill>
+        <p:spPr>
+          <a:xfrm>
+            <a:off x="687232" y="1167156"/>
+            <a:ext cx="1993243" cy="5209107"/>
+          </a:xfrm>
+          <a:prstGeom prst="roundRect">
+            <a:avLst>
+              <a:gd name="adj" fmla="val 4167"/>
+            </a:avLst>
+          </a:prstGeom>
+          <a:solidFill>
+            <a:srgbClr val="FFFFFF"/>
+          </a:solidFill>
+          <a:ln w="76200" cap="sq">
+            <a:solidFill>
+              <a:srgbClr val="292929"/>
+            </a:solidFill>
+            <a:miter lim="800000"/>
+          </a:ln>
+          <a:effectLst>
+            <a:reflection blurRad="12700" stA="28000" endPos="28000" dist="5000" dir="5400000" sy="-100000" algn="bl" rotWithShape="0"/>
+          </a:effectLst>
+          <a:scene3d>
+            <a:camera prst="orthographicFront"/>
+            <a:lightRig rig="threePt" dir="t">
+              <a:rot lat="0" lon="0" rev="2700000"/>
+            </a:lightRig>
+          </a:scene3d>
+          <a:sp3d>
+            <a:bevelT h="38100"/>
+            <a:contourClr>
+              <a:srgbClr val="C0C0C0"/>
+            </a:contourClr>
+          </a:sp3d>
+        </p:spPr>
+      </p:pic>
+      <p:pic>
+        <p:nvPicPr>
+          <p:cNvPr id="27" name="Image 26">
+            <a:extLst>
+              <a:ext uri="{FF2B5EF4-FFF2-40B4-BE49-F238E27FC236}">
+                <a16:creationId xmlns:a16="http://schemas.microsoft.com/office/drawing/2014/main" id="{D33E9620-8464-3B42-4CCD-907F841E769D}"/>
+              </a:ext>
+            </a:extLst>
+          </p:cNvPr>
+          <p:cNvPicPr>
+            <a:picLocks noChangeAspect="1"/>
+          </p:cNvPicPr>
+          <p:nvPr/>
+        </p:nvPicPr>
+        <p:blipFill>
+          <a:blip r:embed="rId6">
+            <a:extLst>
+              <a:ext uri="{28A0092B-C50C-407E-A947-70E740481C1C}">
+                <a14:useLocalDpi xmlns:a14="http://schemas.microsoft.com/office/drawing/2010/main" val="0"/>
+              </a:ext>
+            </a:extLst>
+          </a:blip>
+          <a:stretch>
+            <a:fillRect/>
+          </a:stretch>
+        </p:blipFill>
+        <p:spPr>
+          <a:xfrm>
+            <a:off x="3496461" y="1187068"/>
+            <a:ext cx="2183267" cy="5185652"/>
+          </a:xfrm>
+          <a:prstGeom prst="roundRect">
+            <a:avLst>
+              <a:gd name="adj" fmla="val 4167"/>
+            </a:avLst>
+          </a:prstGeom>
+          <a:solidFill>
+            <a:srgbClr val="FFFFFF"/>
+          </a:solidFill>
+          <a:ln w="76200" cap="sq">
+            <a:solidFill>
+              <a:srgbClr val="292929"/>
+            </a:solidFill>
+            <a:miter lim="800000"/>
+          </a:ln>
+          <a:effectLst>
+            <a:reflection blurRad="12700" stA="28000" endPos="28000" dist="5000" dir="5400000" sy="-100000" algn="bl" rotWithShape="0"/>
+          </a:effectLst>
+          <a:scene3d>
+            <a:camera prst="orthographicFront"/>
+            <a:lightRig rig="threePt" dir="t">
+              <a:rot lat="0" lon="0" rev="2700000"/>
+            </a:lightRig>
+          </a:scene3d>
+          <a:sp3d>
+            <a:bevelT h="38100"/>
+            <a:contourClr>
+              <a:srgbClr val="C0C0C0"/>
+            </a:contourClr>
+          </a:sp3d>
+        </p:spPr>
+      </p:pic>
+      <p:pic>
+        <p:nvPicPr>
+          <p:cNvPr id="31" name="Image 30">
+            <a:extLst>
+              <a:ext uri="{FF2B5EF4-FFF2-40B4-BE49-F238E27FC236}">
+                <a16:creationId xmlns:a16="http://schemas.microsoft.com/office/drawing/2014/main" id="{F68BA55B-771A-D184-A0BB-75A6A51FD700}"/>
+              </a:ext>
+            </a:extLst>
+          </p:cNvPr>
+          <p:cNvPicPr>
+            <a:picLocks noChangeAspect="1"/>
+          </p:cNvPicPr>
+          <p:nvPr/>
+        </p:nvPicPr>
+        <p:blipFill>
+          <a:blip r:embed="rId7">
+            <a:extLst>
+              <a:ext uri="{28A0092B-C50C-407E-A947-70E740481C1C}">
+                <a14:useLocalDpi xmlns:a14="http://schemas.microsoft.com/office/drawing/2010/main" val="0"/>
+              </a:ext>
+            </a:extLst>
+          </a:blip>
+          <a:stretch>
+            <a:fillRect/>
+          </a:stretch>
+        </p:blipFill>
+        <p:spPr>
+          <a:xfrm>
+            <a:off x="6341281" y="1187068"/>
+            <a:ext cx="2100509" cy="5169282"/>
+          </a:xfrm>
+          <a:prstGeom prst="roundRect">
+            <a:avLst>
+              <a:gd name="adj" fmla="val 4167"/>
+            </a:avLst>
+          </a:prstGeom>
+          <a:solidFill>
+            <a:srgbClr val="FFFFFF"/>
+          </a:solidFill>
+          <a:ln w="76200" cap="sq">
+            <a:solidFill>
+              <a:srgbClr val="292929"/>
+            </a:solidFill>
+            <a:miter lim="800000"/>
+          </a:ln>
+          <a:effectLst>
+            <a:reflection blurRad="12700" stA="28000" endPos="28000" dist="5000" dir="5400000" sy="-100000" algn="bl" rotWithShape="0"/>
+          </a:effectLst>
+          <a:scene3d>
+            <a:camera prst="orthographicFront"/>
+            <a:lightRig rig="threePt" dir="t">
+              <a:rot lat="0" lon="0" rev="2700000"/>
+            </a:lightRig>
+          </a:scene3d>
+          <a:sp3d>
+            <a:bevelT h="38100"/>
+            <a:contourClr>
+              <a:srgbClr val="C0C0C0"/>
+            </a:contourClr>
+          </a:sp3d>
+        </p:spPr>
+      </p:pic>
+      <p:sp>
+        <p:nvSpPr>
+          <p:cNvPr id="33" name="ZoneTexte 32">
+            <a:extLst>
+              <a:ext uri="{FF2B5EF4-FFF2-40B4-BE49-F238E27FC236}">
+                <a16:creationId xmlns:a16="http://schemas.microsoft.com/office/drawing/2014/main" id="{AA4FFC1D-9C7C-AF03-9B3A-747C35F838DF}"/>
+              </a:ext>
+            </a:extLst>
+          </p:cNvPr>
+          <p:cNvSpPr txBox="1"/>
+          <p:nvPr/>
+        </p:nvSpPr>
+        <p:spPr>
+          <a:xfrm>
+            <a:off x="2469394" y="496177"/>
+            <a:ext cx="6526915" cy="369332"/>
+          </a:xfrm>
+          <a:prstGeom prst="rect">
+            <a:avLst/>
+          </a:prstGeom>
+          <a:noFill/>
+        </p:spPr>
+        <p:txBody>
+          <a:bodyPr wrap="none" rtlCol="0">
+            <a:spAutoFit/>
+          </a:bodyPr>
+          <a:lstStyle/>
+          <a:p>
+            <a:r>
+              <a:rPr lang="fr-FR" b="1" dirty="0"/>
+              <a:t>Ensemble des ticket techniques pour la réalisation de Menu maker</a:t>
+            </a:r>
+          </a:p>
+        </p:txBody>
+      </p:sp>
+    </p:spTree>
+    <p:extLst>
+      <p:ext uri="{BB962C8B-B14F-4D97-AF65-F5344CB8AC3E}">
+        <p14:creationId xmlns:p14="http://schemas.microsoft.com/office/powerpoint/2010/main" val="2679013193"/>
+      </p:ext>
+    </p:extLst>
+  </p:cSld>
+  <p:clrMapOvr>
+    <a:masterClrMapping/>
+  </p:clrMapOvr>
+</p:sld>
+</file>
+
+<file path=ppt/slides/slide13.xml><?xml version="1.0" encoding="utf-8"?>
+<p:sld xmlns:a="http://schemas.openxmlformats.org/drawingml/2006/main" xmlns:r="http://schemas.openxmlformats.org/officeDocument/2006/relationships" xmlns:p="http://schemas.openxmlformats.org/presentationml/2006/main">
+  <p:cSld>
+    <p:spTree>
+      <p:nvGrpSpPr>
+        <p:cNvPr id="1" name=""/>
+        <p:cNvGrpSpPr/>
+        <p:nvPr/>
+      </p:nvGrpSpPr>
+      <p:grpSpPr>
+        <a:xfrm>
+          <a:off x="0" y="0"/>
+          <a:ext cx="0" cy="0"/>
+          <a:chOff x="0" y="0"/>
+          <a:chExt cx="0" cy="0"/>
+        </a:xfrm>
+      </p:grpSpPr>
+      <p:pic>
+        <p:nvPicPr>
+          <p:cNvPr id="7" name="Espace réservé du contenu 6">
+            <a:extLst>
+              <a:ext uri="{FF2B5EF4-FFF2-40B4-BE49-F238E27FC236}">
+                <a16:creationId xmlns:a16="http://schemas.microsoft.com/office/drawing/2014/main" id="{BC174D30-A627-838A-7E69-7E16EC650580}"/>
+              </a:ext>
+            </a:extLst>
+          </p:cNvPr>
+          <p:cNvPicPr>
+            <a:picLocks noGrp="1" noChangeAspect="1"/>
+          </p:cNvPicPr>
+          <p:nvPr>
+            <p:ph idx="1"/>
+          </p:nvPr>
+        </p:nvPicPr>
+        <p:blipFill>
+          <a:blip r:embed="rId2">
+            <a:extLst>
+              <a:ext uri="{28A0092B-C50C-407E-A947-70E740481C1C}">
+                <a14:useLocalDpi xmlns:a14="http://schemas.microsoft.com/office/drawing/2010/main" val="0"/>
+              </a:ext>
+            </a:extLst>
+          </a:blip>
+          <a:stretch>
+            <a:fillRect/>
+          </a:stretch>
+        </p:blipFill>
+        <p:spPr>
+          <a:xfrm>
+            <a:off x="0" y="-1"/>
+            <a:ext cx="12191999" cy="7108167"/>
+          </a:xfrm>
+        </p:spPr>
+      </p:pic>
+      <p:sp>
+        <p:nvSpPr>
+          <p:cNvPr id="4" name="Espace réservé de la date 3">
+            <a:extLst>
+              <a:ext uri="{FF2B5EF4-FFF2-40B4-BE49-F238E27FC236}">
+                <a16:creationId xmlns:a16="http://schemas.microsoft.com/office/drawing/2014/main" id="{E7F8C2F8-7A8F-D84C-8361-031B58CEE89E}"/>
+              </a:ext>
+            </a:extLst>
+          </p:cNvPr>
+          <p:cNvSpPr>
+            <a:spLocks noGrp="1"/>
+          </p:cNvSpPr>
+          <p:nvPr>
+            <p:ph type="dt" sz="half" idx="10"/>
+          </p:nvPr>
+        </p:nvSpPr>
+        <p:spPr/>
+        <p:txBody>
+          <a:bodyPr/>
+          <a:lstStyle/>
+          <a:p>
+            <a:fld id="{B21E7010-4D3E-4C28-99D1-136D20F29935}" type="datetime1">
+              <a:rPr lang="fr-FR" smtClean="0"/>
+              <a:t>10/05/2023</a:t>
+            </a:fld>
+            <a:endParaRPr lang="fr-FR"/>
+          </a:p>
+        </p:txBody>
+      </p:sp>
+      <p:sp>
+        <p:nvSpPr>
+          <p:cNvPr id="5" name="Espace réservé du numéro de diapositive 4">
+            <a:extLst>
+              <a:ext uri="{FF2B5EF4-FFF2-40B4-BE49-F238E27FC236}">
+                <a16:creationId xmlns:a16="http://schemas.microsoft.com/office/drawing/2014/main" id="{1A6EFC36-E191-2806-CFFF-0AF104D36107}"/>
+              </a:ext>
+            </a:extLst>
+          </p:cNvPr>
+          <p:cNvSpPr>
+            <a:spLocks noGrp="1"/>
+          </p:cNvSpPr>
+          <p:nvPr>
+            <p:ph type="sldNum" sz="quarter" idx="12"/>
+          </p:nvPr>
+        </p:nvSpPr>
+        <p:spPr/>
+        <p:txBody>
+          <a:bodyPr/>
+          <a:lstStyle/>
+          <a:p>
+            <a:fld id="{95C870F5-2469-49EC-A44E-C9B5362F8607}" type="slidenum">
+              <a:rPr lang="fr-FR" smtClean="0"/>
+              <a:t>13</a:t>
+            </a:fld>
+            <a:endParaRPr lang="fr-FR"/>
+          </a:p>
+        </p:txBody>
+      </p:sp>
+    </p:spTree>
+    <p:extLst>
+      <p:ext uri="{BB962C8B-B14F-4D97-AF65-F5344CB8AC3E}">
+        <p14:creationId xmlns:p14="http://schemas.microsoft.com/office/powerpoint/2010/main" val="2605616584"/>
+      </p:ext>
+    </p:extLst>
+  </p:cSld>
+  <p:clrMapOvr>
+    <a:masterClrMapping/>
+  </p:clrMapOvr>
+</p:sld>
+</file>
+
+<file path=ppt/slides/slide14.xml><?xml version="1.0" encoding="utf-8"?>
 <p:sld xmlns:a="http://schemas.openxmlformats.org/drawingml/2006/main" xmlns:r="http://schemas.openxmlformats.org/officeDocument/2006/relationships" xmlns:p="http://schemas.openxmlformats.org/presentationml/2006/main">
   <p:cSld>
     <p:bg>
@@ -4060,287 +5517,6 @@
               <a:defRPr/>
             </a:pPr>
             <a:r>
-              <a:rPr kumimoji="0" lang="en-US" sz="3200" b="0" i="1" u="none" strike="noStrike" kern="1200" cap="none" spc="0" normalizeH="0" baseline="0" noProof="0" dirty="0" err="1">
-                <a:ln>
-                  <a:noFill/>
-                </a:ln>
-                <a:solidFill>
-                  <a:prstClr val="white"/>
-                </a:solidFill>
-                <a:effectLst/>
-                <a:uLnTx/>
-                <a:uFillTx/>
-                <a:latin typeface="Calibri Light" panose="020F0302020204030204"/>
-                <a:ea typeface="+mn-ea"/>
-                <a:cs typeface="+mn-cs"/>
-              </a:rPr>
-              <a:t>Visite</a:t>
-            </a:r>
-            <a:r>
-              <a:rPr kumimoji="0" lang="en-US" sz="3200" b="0" i="1" u="none" strike="noStrike" kern="1200" cap="none" spc="0" normalizeH="0" baseline="0" noProof="0" dirty="0">
-                <a:ln>
-                  <a:noFill/>
-                </a:ln>
-                <a:solidFill>
-                  <a:prstClr val="white"/>
-                </a:solidFill>
-                <a:effectLst/>
-                <a:uLnTx/>
-                <a:uFillTx/>
-                <a:latin typeface="Calibri Light" panose="020F0302020204030204"/>
-                <a:ea typeface="+mn-ea"/>
-                <a:cs typeface="+mn-cs"/>
-              </a:rPr>
-              <a:t> </a:t>
-            </a:r>
-            <a:r>
-              <a:rPr kumimoji="0" lang="en-US" sz="3200" b="0" i="1" u="none" strike="noStrike" kern="1200" cap="none" spc="0" normalizeH="0" baseline="0" noProof="0" dirty="0" err="1">
-                <a:ln>
-                  <a:noFill/>
-                </a:ln>
-                <a:solidFill>
-                  <a:prstClr val="white"/>
-                </a:solidFill>
-                <a:effectLst/>
-                <a:uLnTx/>
-                <a:uFillTx/>
-                <a:latin typeface="Calibri Light" panose="020F0302020204030204"/>
-                <a:ea typeface="+mn-ea"/>
-                <a:cs typeface="+mn-cs"/>
-              </a:rPr>
-              <a:t>guidée</a:t>
-            </a:r>
-            <a:r>
-              <a:rPr kumimoji="0" lang="en-US" sz="3200" b="0" i="1" u="none" strike="noStrike" kern="1200" cap="none" spc="0" normalizeH="0" baseline="0" noProof="0" dirty="0">
-                <a:ln>
-                  <a:noFill/>
-                </a:ln>
-                <a:solidFill>
-                  <a:prstClr val="white"/>
-                </a:solidFill>
-                <a:effectLst/>
-                <a:uLnTx/>
-                <a:uFillTx/>
-                <a:latin typeface="Calibri Light" panose="020F0302020204030204"/>
-                <a:ea typeface="+mn-ea"/>
-                <a:cs typeface="+mn-cs"/>
-              </a:rPr>
-              <a:t> de Menu Maker</a:t>
-            </a:r>
-          </a:p>
-        </p:txBody>
-      </p:sp>
-      <p:pic>
-        <p:nvPicPr>
-          <p:cNvPr id="5" name="Image 4" descr="Une image contenant texte, lettre&#10;&#10;Description générée automatiquement">
-            <a:extLst>
-              <a:ext uri="{FF2B5EF4-FFF2-40B4-BE49-F238E27FC236}">
-                <a16:creationId xmlns:a16="http://schemas.microsoft.com/office/drawing/2014/main" id="{D3D1EF4A-5310-8094-9CFA-254314F0BB6B}"/>
-              </a:ext>
-            </a:extLst>
-          </p:cNvPr>
-          <p:cNvPicPr>
-            <a:picLocks noChangeAspect="1"/>
-          </p:cNvPicPr>
-          <p:nvPr/>
-        </p:nvPicPr>
-        <p:blipFill>
-          <a:blip r:embed="rId2">
-            <a:extLst>
-              <a:ext uri="{28A0092B-C50C-407E-A947-70E740481C1C}">
-                <a14:useLocalDpi xmlns:a14="http://schemas.microsoft.com/office/drawing/2010/main" val="0"/>
-              </a:ext>
-            </a:extLst>
-          </a:blip>
-          <a:stretch>
-            <a:fillRect/>
-          </a:stretch>
-        </p:blipFill>
-        <p:spPr>
-          <a:xfrm>
-            <a:off x="0" y="1718577"/>
-            <a:ext cx="12192000" cy="5139423"/>
-          </a:xfrm>
-          <a:prstGeom prst="rect">
-            <a:avLst/>
-          </a:prstGeom>
-        </p:spPr>
-      </p:pic>
-    </p:spTree>
-    <p:extLst>
-      <p:ext uri="{BB962C8B-B14F-4D97-AF65-F5344CB8AC3E}">
-        <p14:creationId xmlns:p14="http://schemas.microsoft.com/office/powerpoint/2010/main" val="64866013"/>
-      </p:ext>
-    </p:extLst>
-  </p:cSld>
-  <p:clrMapOvr>
-    <a:masterClrMapping/>
-  </p:clrMapOvr>
-</p:sld>
-</file>
-
-<file path=ppt/slides/slide12.xml><?xml version="1.0" encoding="utf-8"?>
-<p:sld xmlns:a="http://schemas.openxmlformats.org/drawingml/2006/main" xmlns:r="http://schemas.openxmlformats.org/officeDocument/2006/relationships" xmlns:p="http://schemas.openxmlformats.org/presentationml/2006/main">
-  <p:cSld>
-    <p:bg>
-      <p:bgPr>
-        <a:solidFill>
-          <a:schemeClr val="bg1"/>
-        </a:solidFill>
-        <a:effectLst/>
-      </p:bgPr>
-    </p:bg>
-    <p:spTree>
-      <p:nvGrpSpPr>
-        <p:cNvPr id="1" name=""/>
-        <p:cNvGrpSpPr/>
-        <p:nvPr/>
-      </p:nvGrpSpPr>
-      <p:grpSpPr>
-        <a:xfrm>
-          <a:off x="0" y="0"/>
-          <a:ext cx="0" cy="0"/>
-          <a:chOff x="0" y="0"/>
-          <a:chExt cx="0" cy="0"/>
-        </a:xfrm>
-      </p:grpSpPr>
-      <p:sp>
-        <p:nvSpPr>
-          <p:cNvPr id="11" name="Rectangle 10">
-            <a:extLst>
-              <a:ext uri="{FF2B5EF4-FFF2-40B4-BE49-F238E27FC236}">
-                <a16:creationId xmlns:a16="http://schemas.microsoft.com/office/drawing/2014/main" id="{A4AC5506-6312-4701-8D3C-40187889A947}"/>
-              </a:ext>
-              <a:ext uri="{C183D7F6-B498-43B3-948B-1728B52AA6E4}">
-                <adec:decorative xmlns:adec="http://schemas.microsoft.com/office/drawing/2017/decorative" val="1"/>
-              </a:ext>
-            </a:extLst>
-          </p:cNvPr>
-          <p:cNvSpPr>
-            <a:spLocks noGrp="1" noRot="1" noChangeAspect="1" noMove="1" noResize="1" noEditPoints="1" noAdjustHandles="1" noChangeArrowheads="1" noChangeShapeType="1" noTextEdit="1"/>
-          </p:cNvSpPr>
-          <p:nvPr>
-            <p:extLst>
-              <p:ext uri="{386F3935-93C4-4BCD-93E2-E3B085C9AB24}">
-                <p16:designElem xmlns:p16="http://schemas.microsoft.com/office/powerpoint/2015/main" val="1"/>
-              </p:ext>
-            </p:extLst>
-          </p:nvPr>
-        </p:nvSpPr>
-        <p:spPr>
-          <a:xfrm>
-            <a:off x="0" y="651752"/>
-            <a:ext cx="12192000" cy="736551"/>
-          </a:xfrm>
-          <a:prstGeom prst="rect">
-            <a:avLst/>
-          </a:prstGeom>
-          <a:solidFill>
-            <a:schemeClr val="tx1"/>
-          </a:solidFill>
-          <a:ln>
-            <a:noFill/>
-          </a:ln>
-        </p:spPr>
-        <p:style>
-          <a:lnRef idx="2">
-            <a:schemeClr val="accent1">
-              <a:shade val="50000"/>
-            </a:schemeClr>
-          </a:lnRef>
-          <a:fillRef idx="1">
-            <a:schemeClr val="accent1"/>
-          </a:fillRef>
-          <a:effectRef idx="0">
-            <a:schemeClr val="accent1"/>
-          </a:effectRef>
-          <a:fontRef idx="minor">
-            <a:schemeClr val="lt1"/>
-          </a:fontRef>
-        </p:style>
-        <p:txBody>
-          <a:bodyPr rtlCol="0" anchor="ctr"/>
-          <a:lstStyle/>
-          <a:p>
-            <a:pPr marL="0" marR="0" lvl="0" indent="0" algn="ctr" defTabSz="914400" rtl="0" eaLnBrk="1" fontAlgn="auto" latinLnBrk="0" hangingPunct="1">
-              <a:lnSpc>
-                <a:spcPct val="100000"/>
-              </a:lnSpc>
-              <a:spcBef>
-                <a:spcPts val="0"/>
-              </a:spcBef>
-              <a:spcAft>
-                <a:spcPts val="0"/>
-              </a:spcAft>
-              <a:buClrTx/>
-              <a:buSzTx/>
-              <a:buFontTx/>
-              <a:buNone/>
-              <a:tabLst/>
-              <a:defRPr/>
-            </a:pPr>
-            <a:endParaRPr kumimoji="0" lang="en-US" sz="1800" b="0" i="0" u="none" strike="noStrike" kern="1200" cap="none" spc="0" normalizeH="0" baseline="0" noProof="0">
-              <a:ln>
-                <a:noFill/>
-              </a:ln>
-              <a:solidFill>
-                <a:prstClr val="white"/>
-              </a:solidFill>
-              <a:effectLst/>
-              <a:uLnTx/>
-              <a:uFillTx/>
-              <a:latin typeface="Calibri" panose="020F0502020204030204"/>
-              <a:ea typeface="+mn-ea"/>
-              <a:cs typeface="+mn-cs"/>
-            </a:endParaRPr>
-          </a:p>
-        </p:txBody>
-      </p:sp>
-      <p:sp>
-        <p:nvSpPr>
-          <p:cNvPr id="6" name="ZoneTexte 5">
-            <a:extLst>
-              <a:ext uri="{FF2B5EF4-FFF2-40B4-BE49-F238E27FC236}">
-                <a16:creationId xmlns:a16="http://schemas.microsoft.com/office/drawing/2014/main" id="{C4BBAD3D-5AF2-E31A-957D-28EBE5AD4D4A}"/>
-              </a:ext>
-            </a:extLst>
-          </p:cNvPr>
-          <p:cNvSpPr txBox="1"/>
-          <p:nvPr/>
-        </p:nvSpPr>
-        <p:spPr>
-          <a:xfrm>
-            <a:off x="556532" y="643467"/>
-            <a:ext cx="11210925" cy="744836"/>
-          </a:xfrm>
-          <a:prstGeom prst="rect">
-            <a:avLst/>
-          </a:prstGeom>
-        </p:spPr>
-        <p:txBody>
-          <a:bodyPr vert="horz" lIns="91440" tIns="45720" rIns="91440" bIns="45720" rtlCol="0" anchor="ctr">
-            <a:normAutofit/>
-          </a:bodyPr>
-          <a:lstStyle/>
-          <a:p>
-            <a:pPr marL="0" marR="0" lvl="0" indent="0" algn="ctr" defTabSz="914400" rtl="0" eaLnBrk="1" fontAlgn="auto" latinLnBrk="0" hangingPunct="1">
-              <a:lnSpc>
-                <a:spcPct val="90000"/>
-              </a:lnSpc>
-              <a:spcBef>
-                <a:spcPct val="0"/>
-              </a:spcBef>
-              <a:spcAft>
-                <a:spcPts val="600"/>
-              </a:spcAft>
-              <a:buClrTx/>
-              <a:buSzTx/>
-              <a:buFontTx/>
-              <a:buNone/>
-              <a:tabLst/>
-              <a:defRPr/>
-            </a:pPr>
-            <a:r>
               <a:rPr kumimoji="0" lang="en-US" sz="3200" b="0" i="1" u="none" strike="noStrike" kern="1200" cap="none" spc="0" normalizeH="0" baseline="0" noProof="0" dirty="0">
                 <a:ln>
                   <a:noFill/>
@@ -4430,6 +5606,64 @@
           </a:prstGeom>
         </p:spPr>
       </p:pic>
+      <p:sp>
+        <p:nvSpPr>
+          <p:cNvPr id="2" name="Espace réservé de la date 1">
+            <a:extLst>
+              <a:ext uri="{FF2B5EF4-FFF2-40B4-BE49-F238E27FC236}">
+                <a16:creationId xmlns:a16="http://schemas.microsoft.com/office/drawing/2014/main" id="{F0C24D41-C6E5-2414-6D06-07D182B53A8E}"/>
+              </a:ext>
+            </a:extLst>
+          </p:cNvPr>
+          <p:cNvSpPr>
+            <a:spLocks noGrp="1"/>
+          </p:cNvSpPr>
+          <p:nvPr>
+            <p:ph type="dt" sz="half" idx="10"/>
+          </p:nvPr>
+        </p:nvSpPr>
+        <p:spPr/>
+        <p:txBody>
+          <a:bodyPr/>
+          <a:lstStyle/>
+          <a:p>
+            <a:fld id="{DA3993FE-A50C-410D-8E07-DE65B5FAFB8E}" type="datetime1">
+              <a:rPr lang="fr-FR" smtClean="0"/>
+              <a:t>10/05/2023</a:t>
+            </a:fld>
+            <a:endParaRPr lang="fr-FR"/>
+          </a:p>
+        </p:txBody>
+      </p:sp>
+      <p:sp>
+        <p:nvSpPr>
+          <p:cNvPr id="3" name="Espace réservé du numéro de diapositive 2">
+            <a:extLst>
+              <a:ext uri="{FF2B5EF4-FFF2-40B4-BE49-F238E27FC236}">
+                <a16:creationId xmlns:a16="http://schemas.microsoft.com/office/drawing/2014/main" id="{17005FBB-82A2-D187-45E5-66FAF4F4E3DA}"/>
+              </a:ext>
+            </a:extLst>
+          </p:cNvPr>
+          <p:cNvSpPr>
+            <a:spLocks noGrp="1"/>
+          </p:cNvSpPr>
+          <p:nvPr>
+            <p:ph type="sldNum" sz="quarter" idx="12"/>
+          </p:nvPr>
+        </p:nvSpPr>
+        <p:spPr/>
+        <p:txBody>
+          <a:bodyPr/>
+          <a:lstStyle/>
+          <a:p>
+            <a:fld id="{95C870F5-2469-49EC-A44E-C9B5362F8607}" type="slidenum">
+              <a:rPr lang="fr-FR" smtClean="0"/>
+              <a:t>14</a:t>
+            </a:fld>
+            <a:endParaRPr lang="fr-FR"/>
+          </a:p>
+        </p:txBody>
+      </p:sp>
     </p:spTree>
     <p:extLst>
       <p:ext uri="{BB962C8B-B14F-4D97-AF65-F5344CB8AC3E}">
@@ -4726,8 +5960,8 @@
         </p:nvSpPr>
         <p:spPr>
           <a:xfrm>
-            <a:off x="879895" y="2881223"/>
-            <a:ext cx="4834209" cy="2585323"/>
+            <a:off x="838200" y="2801115"/>
+            <a:ext cx="5003549" cy="2308324"/>
           </a:xfrm>
           <a:prstGeom prst="rect">
             <a:avLst/>
@@ -4746,7 +5980,7 @@
             </a:pPr>
             <a:r>
               <a:rPr lang="fr-FR" b="1" dirty="0"/>
-              <a:t>Le fonctionnement de MENU Maker</a:t>
+              <a:t>Le fonctionnement de Menu Maker</a:t>
             </a:r>
           </a:p>
           <a:p>
@@ -4799,7 +6033,7 @@
             </a:pPr>
             <a:r>
               <a:rPr lang="fr-FR" b="1" dirty="0"/>
-              <a:t>Visite guidée et commentée de Menu Maker</a:t>
+              <a:t>La réalisation de Menu Maker par nos équipes</a:t>
             </a:r>
           </a:p>
           <a:p>
@@ -4809,12 +6043,63 @@
             </a:pPr>
             <a:endParaRPr lang="fr-FR" b="1" dirty="0"/>
           </a:p>
-          <a:p>
-            <a:pPr marL="400050" indent="-400050">
-              <a:buFont typeface="+mj-lt"/>
-              <a:buAutoNum type="romanUcPeriod"/>
-            </a:pPr>
-            <a:endParaRPr lang="fr-FR" b="1" dirty="0"/>
+        </p:txBody>
+      </p:sp>
+      <p:sp>
+        <p:nvSpPr>
+          <p:cNvPr id="4" name="Espace réservé de la date 3">
+            <a:extLst>
+              <a:ext uri="{FF2B5EF4-FFF2-40B4-BE49-F238E27FC236}">
+                <a16:creationId xmlns:a16="http://schemas.microsoft.com/office/drawing/2014/main" id="{3FCB0D84-301F-701F-FED4-E5C03F8AFF7D}"/>
+              </a:ext>
+            </a:extLst>
+          </p:cNvPr>
+          <p:cNvSpPr>
+            <a:spLocks noGrp="1"/>
+          </p:cNvSpPr>
+          <p:nvPr>
+            <p:ph type="dt" sz="half" idx="10"/>
+          </p:nvPr>
+        </p:nvSpPr>
+        <p:spPr/>
+        <p:txBody>
+          <a:bodyPr/>
+          <a:lstStyle/>
+          <a:p>
+            <a:fld id="{6C55B61A-2025-4D59-92E2-6C75DCBCCC62}" type="datetime1">
+              <a:rPr lang="fr-FR" smtClean="0"/>
+              <a:t>10/05/2023</a:t>
+            </a:fld>
+            <a:endParaRPr lang="fr-FR"/>
+          </a:p>
+        </p:txBody>
+      </p:sp>
+      <p:sp>
+        <p:nvSpPr>
+          <p:cNvPr id="7" name="Espace réservé du numéro de diapositive 6">
+            <a:extLst>
+              <a:ext uri="{FF2B5EF4-FFF2-40B4-BE49-F238E27FC236}">
+                <a16:creationId xmlns:a16="http://schemas.microsoft.com/office/drawing/2014/main" id="{664610C4-5468-5BCA-AC97-A3DE8694BE09}"/>
+              </a:ext>
+            </a:extLst>
+          </p:cNvPr>
+          <p:cNvSpPr>
+            <a:spLocks noGrp="1"/>
+          </p:cNvSpPr>
+          <p:nvPr>
+            <p:ph type="sldNum" sz="quarter" idx="12"/>
+          </p:nvPr>
+        </p:nvSpPr>
+        <p:spPr/>
+        <p:txBody>
+          <a:bodyPr/>
+          <a:lstStyle/>
+          <a:p>
+            <a:fld id="{95C870F5-2469-49EC-A44E-C9B5362F8607}" type="slidenum">
+              <a:rPr lang="fr-FR" smtClean="0"/>
+              <a:t>2</a:t>
+            </a:fld>
+            <a:endParaRPr lang="fr-FR"/>
           </a:p>
         </p:txBody>
       </p:sp>
@@ -5412,6 +6697,64 @@
           </a:p>
         </p:txBody>
       </p:sp>
+      <p:sp>
+        <p:nvSpPr>
+          <p:cNvPr id="3" name="Espace réservé de la date 2">
+            <a:extLst>
+              <a:ext uri="{FF2B5EF4-FFF2-40B4-BE49-F238E27FC236}">
+                <a16:creationId xmlns:a16="http://schemas.microsoft.com/office/drawing/2014/main" id="{15167C7A-F6A4-0542-138E-B1C54FE16333}"/>
+              </a:ext>
+            </a:extLst>
+          </p:cNvPr>
+          <p:cNvSpPr>
+            <a:spLocks noGrp="1"/>
+          </p:cNvSpPr>
+          <p:nvPr>
+            <p:ph type="dt" sz="half" idx="10"/>
+          </p:nvPr>
+        </p:nvSpPr>
+        <p:spPr/>
+        <p:txBody>
+          <a:bodyPr/>
+          <a:lstStyle/>
+          <a:p>
+            <a:fld id="{DDE327C8-B302-49D1-AAF0-E953D827907F}" type="datetime1">
+              <a:rPr lang="fr-FR" smtClean="0"/>
+              <a:t>10/05/2023</a:t>
+            </a:fld>
+            <a:endParaRPr lang="fr-FR"/>
+          </a:p>
+        </p:txBody>
+      </p:sp>
+      <p:sp>
+        <p:nvSpPr>
+          <p:cNvPr id="5" name="Espace réservé du numéro de diapositive 4">
+            <a:extLst>
+              <a:ext uri="{FF2B5EF4-FFF2-40B4-BE49-F238E27FC236}">
+                <a16:creationId xmlns:a16="http://schemas.microsoft.com/office/drawing/2014/main" id="{912EDCCF-1B1F-D852-8CB0-4D8F61A7476C}"/>
+              </a:ext>
+            </a:extLst>
+          </p:cNvPr>
+          <p:cNvSpPr>
+            <a:spLocks noGrp="1"/>
+          </p:cNvSpPr>
+          <p:nvPr>
+            <p:ph type="sldNum" sz="quarter" idx="12"/>
+          </p:nvPr>
+        </p:nvSpPr>
+        <p:spPr/>
+        <p:txBody>
+          <a:bodyPr/>
+          <a:lstStyle/>
+          <a:p>
+            <a:fld id="{95C870F5-2469-49EC-A44E-C9B5362F8607}" type="slidenum">
+              <a:rPr lang="fr-FR" smtClean="0"/>
+              <a:t>3</a:t>
+            </a:fld>
+            <a:endParaRPr lang="fr-FR"/>
+          </a:p>
+        </p:txBody>
+      </p:sp>
     </p:spTree>
     <p:extLst>
       <p:ext uri="{BB962C8B-B14F-4D97-AF65-F5344CB8AC3E}">
@@ -6125,6 +7468,64 @@
           </a:p>
         </p:txBody>
       </p:sp>
+      <p:sp>
+        <p:nvSpPr>
+          <p:cNvPr id="7" name="Espace réservé de la date 6">
+            <a:extLst>
+              <a:ext uri="{FF2B5EF4-FFF2-40B4-BE49-F238E27FC236}">
+                <a16:creationId xmlns:a16="http://schemas.microsoft.com/office/drawing/2014/main" id="{B204A552-30A2-467A-1552-5AC804508B8D}"/>
+              </a:ext>
+            </a:extLst>
+          </p:cNvPr>
+          <p:cNvSpPr>
+            <a:spLocks noGrp="1"/>
+          </p:cNvSpPr>
+          <p:nvPr>
+            <p:ph type="dt" sz="half" idx="10"/>
+          </p:nvPr>
+        </p:nvSpPr>
+        <p:spPr/>
+        <p:txBody>
+          <a:bodyPr/>
+          <a:lstStyle/>
+          <a:p>
+            <a:fld id="{F191B6F3-7AE1-4738-A29C-D17342493CD1}" type="datetime1">
+              <a:rPr lang="fr-FR" smtClean="0"/>
+              <a:t>10/05/2023</a:t>
+            </a:fld>
+            <a:endParaRPr lang="fr-FR"/>
+          </a:p>
+        </p:txBody>
+      </p:sp>
+      <p:sp>
+        <p:nvSpPr>
+          <p:cNvPr id="8" name="Espace réservé du numéro de diapositive 7">
+            <a:extLst>
+              <a:ext uri="{FF2B5EF4-FFF2-40B4-BE49-F238E27FC236}">
+                <a16:creationId xmlns:a16="http://schemas.microsoft.com/office/drawing/2014/main" id="{4D7F9914-1E0E-A1D7-D5E0-268550478EB5}"/>
+              </a:ext>
+            </a:extLst>
+          </p:cNvPr>
+          <p:cNvSpPr>
+            <a:spLocks noGrp="1"/>
+          </p:cNvSpPr>
+          <p:nvPr>
+            <p:ph type="sldNum" sz="quarter" idx="12"/>
+          </p:nvPr>
+        </p:nvSpPr>
+        <p:spPr/>
+        <p:txBody>
+          <a:bodyPr/>
+          <a:lstStyle/>
+          <a:p>
+            <a:fld id="{95C870F5-2469-49EC-A44E-C9B5362F8607}" type="slidenum">
+              <a:rPr lang="fr-FR" smtClean="0"/>
+              <a:t>4</a:t>
+            </a:fld>
+            <a:endParaRPr lang="fr-FR"/>
+          </a:p>
+        </p:txBody>
+      </p:sp>
     </p:spTree>
     <p:extLst>
       <p:ext uri="{BB962C8B-B14F-4D97-AF65-F5344CB8AC3E}">
@@ -6662,6 +8063,64 @@
           </a:p>
         </p:txBody>
       </p:sp>
+      <p:sp>
+        <p:nvSpPr>
+          <p:cNvPr id="3" name="Espace réservé de la date 2">
+            <a:extLst>
+              <a:ext uri="{FF2B5EF4-FFF2-40B4-BE49-F238E27FC236}">
+                <a16:creationId xmlns:a16="http://schemas.microsoft.com/office/drawing/2014/main" id="{DA0B77AD-148F-0C98-1499-4DA1E4EF592B}"/>
+              </a:ext>
+            </a:extLst>
+          </p:cNvPr>
+          <p:cNvSpPr>
+            <a:spLocks noGrp="1"/>
+          </p:cNvSpPr>
+          <p:nvPr>
+            <p:ph type="dt" sz="half" idx="10"/>
+          </p:nvPr>
+        </p:nvSpPr>
+        <p:spPr/>
+        <p:txBody>
+          <a:bodyPr/>
+          <a:lstStyle/>
+          <a:p>
+            <a:fld id="{CDBF3A13-F036-45B1-B88B-E65B0E95147B}" type="datetime1">
+              <a:rPr lang="fr-FR" smtClean="0"/>
+              <a:t>10/05/2023</a:t>
+            </a:fld>
+            <a:endParaRPr lang="fr-FR"/>
+          </a:p>
+        </p:txBody>
+      </p:sp>
+      <p:sp>
+        <p:nvSpPr>
+          <p:cNvPr id="4" name="Espace réservé du numéro de diapositive 3">
+            <a:extLst>
+              <a:ext uri="{FF2B5EF4-FFF2-40B4-BE49-F238E27FC236}">
+                <a16:creationId xmlns:a16="http://schemas.microsoft.com/office/drawing/2014/main" id="{32A38505-C04A-903E-C827-ADEF393F34E6}"/>
+              </a:ext>
+            </a:extLst>
+          </p:cNvPr>
+          <p:cNvSpPr>
+            <a:spLocks noGrp="1"/>
+          </p:cNvSpPr>
+          <p:nvPr>
+            <p:ph type="sldNum" sz="quarter" idx="12"/>
+          </p:nvPr>
+        </p:nvSpPr>
+        <p:spPr/>
+        <p:txBody>
+          <a:bodyPr/>
+          <a:lstStyle/>
+          <a:p>
+            <a:fld id="{95C870F5-2469-49EC-A44E-C9B5362F8607}" type="slidenum">
+              <a:rPr lang="fr-FR" smtClean="0"/>
+              <a:t>5</a:t>
+            </a:fld>
+            <a:endParaRPr lang="fr-FR"/>
+          </a:p>
+        </p:txBody>
+      </p:sp>
     </p:spTree>
     <p:extLst>
       <p:ext uri="{BB962C8B-B14F-4D97-AF65-F5344CB8AC3E}">
@@ -6928,6 +8387,64 @@
               <a:rPr lang="fr-FR" b="1" dirty="0"/>
               <a:t>des images et d'autres contenus en ligne. </a:t>
             </a:r>
+          </a:p>
+        </p:txBody>
+      </p:sp>
+      <p:sp>
+        <p:nvSpPr>
+          <p:cNvPr id="3" name="Espace réservé de la date 2">
+            <a:extLst>
+              <a:ext uri="{FF2B5EF4-FFF2-40B4-BE49-F238E27FC236}">
+                <a16:creationId xmlns:a16="http://schemas.microsoft.com/office/drawing/2014/main" id="{3EEE8EEB-F6A8-5400-50B9-E8058A5DACF5}"/>
+              </a:ext>
+            </a:extLst>
+          </p:cNvPr>
+          <p:cNvSpPr>
+            <a:spLocks noGrp="1"/>
+          </p:cNvSpPr>
+          <p:nvPr>
+            <p:ph type="dt" sz="half" idx="10"/>
+          </p:nvPr>
+        </p:nvSpPr>
+        <p:spPr/>
+        <p:txBody>
+          <a:bodyPr/>
+          <a:lstStyle/>
+          <a:p>
+            <a:fld id="{30EB97CD-139F-4870-84BC-0EE44C28F412}" type="datetime1">
+              <a:rPr lang="fr-FR" smtClean="0"/>
+              <a:t>10/05/2023</a:t>
+            </a:fld>
+            <a:endParaRPr lang="fr-FR"/>
+          </a:p>
+        </p:txBody>
+      </p:sp>
+      <p:sp>
+        <p:nvSpPr>
+          <p:cNvPr id="6" name="Espace réservé du numéro de diapositive 5">
+            <a:extLst>
+              <a:ext uri="{FF2B5EF4-FFF2-40B4-BE49-F238E27FC236}">
+                <a16:creationId xmlns:a16="http://schemas.microsoft.com/office/drawing/2014/main" id="{9600C854-0384-86CA-BA89-930AF14543C9}"/>
+              </a:ext>
+            </a:extLst>
+          </p:cNvPr>
+          <p:cNvSpPr>
+            <a:spLocks noGrp="1"/>
+          </p:cNvSpPr>
+          <p:nvPr>
+            <p:ph type="sldNum" sz="quarter" idx="12"/>
+          </p:nvPr>
+        </p:nvSpPr>
+        <p:spPr/>
+        <p:txBody>
+          <a:bodyPr/>
+          <a:lstStyle/>
+          <a:p>
+            <a:fld id="{95C870F5-2469-49EC-A44E-C9B5362F8607}" type="slidenum">
+              <a:rPr lang="fr-FR" smtClean="0"/>
+              <a:t>6</a:t>
+            </a:fld>
+            <a:endParaRPr lang="fr-FR"/>
           </a:p>
         </p:txBody>
       </p:sp>
@@ -7647,6 +9164,64 @@
           </a:p>
         </p:txBody>
       </p:sp>
+      <p:sp>
+        <p:nvSpPr>
+          <p:cNvPr id="2" name="Espace réservé de la date 1">
+            <a:extLst>
+              <a:ext uri="{FF2B5EF4-FFF2-40B4-BE49-F238E27FC236}">
+                <a16:creationId xmlns:a16="http://schemas.microsoft.com/office/drawing/2014/main" id="{26456F68-097A-E546-7C5E-BC897D532E1E}"/>
+              </a:ext>
+            </a:extLst>
+          </p:cNvPr>
+          <p:cNvSpPr>
+            <a:spLocks noGrp="1"/>
+          </p:cNvSpPr>
+          <p:nvPr>
+            <p:ph type="dt" sz="half" idx="10"/>
+          </p:nvPr>
+        </p:nvSpPr>
+        <p:spPr/>
+        <p:txBody>
+          <a:bodyPr/>
+          <a:lstStyle/>
+          <a:p>
+            <a:fld id="{3873530C-F356-4F24-9D39-C93F685A54B1}" type="datetime1">
+              <a:rPr lang="fr-FR" smtClean="0"/>
+              <a:t>10/05/2023</a:t>
+            </a:fld>
+            <a:endParaRPr lang="fr-FR"/>
+          </a:p>
+        </p:txBody>
+      </p:sp>
+      <p:sp>
+        <p:nvSpPr>
+          <p:cNvPr id="6" name="Espace réservé du numéro de diapositive 5">
+            <a:extLst>
+              <a:ext uri="{FF2B5EF4-FFF2-40B4-BE49-F238E27FC236}">
+                <a16:creationId xmlns:a16="http://schemas.microsoft.com/office/drawing/2014/main" id="{7639AEE5-8F54-3B47-3D52-E6D07034119A}"/>
+              </a:ext>
+            </a:extLst>
+          </p:cNvPr>
+          <p:cNvSpPr>
+            <a:spLocks noGrp="1"/>
+          </p:cNvSpPr>
+          <p:nvPr>
+            <p:ph type="sldNum" sz="quarter" idx="12"/>
+          </p:nvPr>
+        </p:nvSpPr>
+        <p:spPr/>
+        <p:txBody>
+          <a:bodyPr/>
+          <a:lstStyle/>
+          <a:p>
+            <a:fld id="{95C870F5-2469-49EC-A44E-C9B5362F8607}" type="slidenum">
+              <a:rPr lang="fr-FR" smtClean="0"/>
+              <a:t>7</a:t>
+            </a:fld>
+            <a:endParaRPr lang="fr-FR"/>
+          </a:p>
+        </p:txBody>
+      </p:sp>
     </p:spTree>
     <p:extLst>
       <p:ext uri="{BB962C8B-B14F-4D97-AF65-F5344CB8AC3E}">
@@ -7918,6 +9493,64 @@
           </a:p>
         </p:txBody>
       </p:sp>
+      <p:sp>
+        <p:nvSpPr>
+          <p:cNvPr id="6" name="Espace réservé de la date 5">
+            <a:extLst>
+              <a:ext uri="{FF2B5EF4-FFF2-40B4-BE49-F238E27FC236}">
+                <a16:creationId xmlns:a16="http://schemas.microsoft.com/office/drawing/2014/main" id="{C31E5BC6-BAE5-654B-D980-9AD4B35B8A7D}"/>
+              </a:ext>
+            </a:extLst>
+          </p:cNvPr>
+          <p:cNvSpPr>
+            <a:spLocks noGrp="1"/>
+          </p:cNvSpPr>
+          <p:nvPr>
+            <p:ph type="dt" sz="half" idx="10"/>
+          </p:nvPr>
+        </p:nvSpPr>
+        <p:spPr/>
+        <p:txBody>
+          <a:bodyPr/>
+          <a:lstStyle/>
+          <a:p>
+            <a:fld id="{A3A6A160-5773-497C-A8D5-3C130F9703FF}" type="datetime1">
+              <a:rPr lang="fr-FR" smtClean="0"/>
+              <a:t>10/05/2023</a:t>
+            </a:fld>
+            <a:endParaRPr lang="fr-FR"/>
+          </a:p>
+        </p:txBody>
+      </p:sp>
+      <p:sp>
+        <p:nvSpPr>
+          <p:cNvPr id="9" name="Espace réservé du numéro de diapositive 8">
+            <a:extLst>
+              <a:ext uri="{FF2B5EF4-FFF2-40B4-BE49-F238E27FC236}">
+                <a16:creationId xmlns:a16="http://schemas.microsoft.com/office/drawing/2014/main" id="{18F846AD-3FF7-6CA1-F4AB-54876F8D3E5D}"/>
+              </a:ext>
+            </a:extLst>
+          </p:cNvPr>
+          <p:cNvSpPr>
+            <a:spLocks noGrp="1"/>
+          </p:cNvSpPr>
+          <p:nvPr>
+            <p:ph type="sldNum" sz="quarter" idx="12"/>
+          </p:nvPr>
+        </p:nvSpPr>
+        <p:spPr/>
+        <p:txBody>
+          <a:bodyPr/>
+          <a:lstStyle/>
+          <a:p>
+            <a:fld id="{95C870F5-2469-49EC-A44E-C9B5362F8607}" type="slidenum">
+              <a:rPr lang="fr-FR" smtClean="0"/>
+              <a:t>8</a:t>
+            </a:fld>
+            <a:endParaRPr lang="fr-FR"/>
+          </a:p>
+        </p:txBody>
+      </p:sp>
     </p:spTree>
     <p:extLst>
       <p:ext uri="{BB962C8B-B14F-4D97-AF65-F5344CB8AC3E}">
@@ -8500,6 +10133,64 @@
               <a:rPr lang="fr-FR" sz="1200" dirty="0"/>
               <a:t>par les développeurs de cet objectif.  </a:t>
             </a:r>
+          </a:p>
+        </p:txBody>
+      </p:sp>
+      <p:sp>
+        <p:nvSpPr>
+          <p:cNvPr id="3" name="Espace réservé de la date 2">
+            <a:extLst>
+              <a:ext uri="{FF2B5EF4-FFF2-40B4-BE49-F238E27FC236}">
+                <a16:creationId xmlns:a16="http://schemas.microsoft.com/office/drawing/2014/main" id="{8E01A35A-F26A-C0AF-2C30-FF92B63D0E12}"/>
+              </a:ext>
+            </a:extLst>
+          </p:cNvPr>
+          <p:cNvSpPr>
+            <a:spLocks noGrp="1"/>
+          </p:cNvSpPr>
+          <p:nvPr>
+            <p:ph type="dt" sz="half" idx="10"/>
+          </p:nvPr>
+        </p:nvSpPr>
+        <p:spPr/>
+        <p:txBody>
+          <a:bodyPr/>
+          <a:lstStyle/>
+          <a:p>
+            <a:fld id="{247E9FB2-8DB6-4828-BF9D-97971CBF2278}" type="datetime1">
+              <a:rPr lang="fr-FR" smtClean="0"/>
+              <a:t>10/05/2023</a:t>
+            </a:fld>
+            <a:endParaRPr lang="fr-FR"/>
+          </a:p>
+        </p:txBody>
+      </p:sp>
+      <p:sp>
+        <p:nvSpPr>
+          <p:cNvPr id="7" name="Espace réservé du numéro de diapositive 6">
+            <a:extLst>
+              <a:ext uri="{FF2B5EF4-FFF2-40B4-BE49-F238E27FC236}">
+                <a16:creationId xmlns:a16="http://schemas.microsoft.com/office/drawing/2014/main" id="{338C03CB-8BB4-B879-1F50-947DED250BB1}"/>
+              </a:ext>
+            </a:extLst>
+          </p:cNvPr>
+          <p:cNvSpPr>
+            <a:spLocks noGrp="1"/>
+          </p:cNvSpPr>
+          <p:nvPr>
+            <p:ph type="sldNum" sz="quarter" idx="12"/>
+          </p:nvPr>
+        </p:nvSpPr>
+        <p:spPr/>
+        <p:txBody>
+          <a:bodyPr/>
+          <a:lstStyle/>
+          <a:p>
+            <a:fld id="{95C870F5-2469-49EC-A44E-C9B5362F8607}" type="slidenum">
+              <a:rPr lang="fr-FR" smtClean="0"/>
+              <a:t>9</a:t>
+            </a:fld>
+            <a:endParaRPr lang="fr-FR"/>
           </a:p>
         </p:txBody>
       </p:sp>
@@ -8809,4 +10500,299 @@
     </a:ext>
   </a:extLst>
 </a:theme>
+</file>
+
+<file path=ppt/theme/theme2.xml><?xml version="1.0" encoding="utf-8"?>
+<a:theme xmlns:a="http://schemas.openxmlformats.org/drawingml/2006/main" name="Thème Office">
+  <a:themeElements>
+    <a:clrScheme name="Office">
+      <a:dk1>
+        <a:sysClr val="windowText" lastClr="000000"/>
+      </a:dk1>
+      <a:lt1>
+        <a:sysClr val="window" lastClr="FFFFFF"/>
+      </a:lt1>
+      <a:dk2>
+        <a:srgbClr val="44546A"/>
+      </a:dk2>
+      <a:lt2>
+        <a:srgbClr val="E7E6E6"/>
+      </a:lt2>
+      <a:accent1>
+        <a:srgbClr val="4472C4"/>
+      </a:accent1>
+      <a:accent2>
+        <a:srgbClr val="ED7D31"/>
+      </a:accent2>
+      <a:accent3>
+        <a:srgbClr val="A5A5A5"/>
+      </a:accent3>
+      <a:accent4>
+        <a:srgbClr val="FFC000"/>
+      </a:accent4>
+      <a:accent5>
+        <a:srgbClr val="5B9BD5"/>
+      </a:accent5>
+      <a:accent6>
+        <a:srgbClr val="70AD47"/>
+      </a:accent6>
+      <a:hlink>
+        <a:srgbClr val="0563C1"/>
+      </a:hlink>
+      <a:folHlink>
+        <a:srgbClr val="954F72"/>
+      </a:folHlink>
+    </a:clrScheme>
+    <a:fontScheme name="Office">
+      <a:majorFont>
+        <a:latin typeface="Calibri Light" panose="020F0302020204030204"/>
+        <a:ea typeface=""/>
+        <a:cs typeface=""/>
+        <a:font script="Jpan" typeface="游ゴシック Light"/>
+        <a:font script="Hang" typeface="맑은 고딕"/>
+        <a:font script="Hans" typeface="等线 Light"/>
+        <a:font script="Hant" typeface="新細明體"/>
+        <a:font script="Arab" typeface="Times New Roman"/>
+        <a:font script="Hebr" typeface="Times New Roman"/>
+        <a:font script="Thai" typeface="Angsana New"/>
+        <a:font script="Ethi" typeface="Nyala"/>
+        <a:font script="Beng" typeface="Vrinda"/>
+        <a:font script="Gujr" typeface="Shruti"/>
+        <a:font script="Khmr" typeface="MoolBoran"/>
+        <a:font script="Knda" typeface="Tunga"/>
+        <a:font script="Guru" typeface="Raavi"/>
+        <a:font script="Cans" typeface="Euphemia"/>
+        <a:font script="Cher" typeface="Plantagenet Cherokee"/>
+        <a:font script="Yiii" typeface="Microsoft Yi Baiti"/>
+        <a:font script="Tibt" typeface="Microsoft Himalaya"/>
+        <a:font script="Thaa" typeface="MV Boli"/>
+        <a:font script="Deva" typeface="Mangal"/>
+        <a:font script="Telu" typeface="Gautami"/>
+        <a:font script="Taml" typeface="Latha"/>
+        <a:font script="Syrc" typeface="Estrangelo Edessa"/>
+        <a:font script="Orya" typeface="Kalinga"/>
+        <a:font script="Mlym" typeface="Kartika"/>
+        <a:font script="Laoo" typeface="DokChampa"/>
+        <a:font script="Sinh" typeface="Iskoola Pota"/>
+        <a:font script="Mong" typeface="Mongolian Baiti"/>
+        <a:font script="Viet" typeface="Times New Roman"/>
+        <a:font script="Uigh" typeface="Microsoft Uighur"/>
+        <a:font script="Geor" typeface="Sylfaen"/>
+        <a:font script="Armn" typeface="Arial"/>
+        <a:font script="Bugi" typeface="Leelawadee UI"/>
+        <a:font script="Bopo" typeface="Microsoft JhengHei"/>
+        <a:font script="Java" typeface="Javanese Text"/>
+        <a:font script="Lisu" typeface="Segoe UI"/>
+        <a:font script="Mymr" typeface="Myanmar Text"/>
+        <a:font script="Nkoo" typeface="Ebrima"/>
+        <a:font script="Olck" typeface="Nirmala UI"/>
+        <a:font script="Osma" typeface="Ebrima"/>
+        <a:font script="Phag" typeface="Phagspa"/>
+        <a:font script="Syrn" typeface="Estrangelo Edessa"/>
+        <a:font script="Syrj" typeface="Estrangelo Edessa"/>
+        <a:font script="Syre" typeface="Estrangelo Edessa"/>
+        <a:font script="Sora" typeface="Nirmala UI"/>
+        <a:font script="Tale" typeface="Microsoft Tai Le"/>
+        <a:font script="Talu" typeface="Microsoft New Tai Lue"/>
+        <a:font script="Tfng" typeface="Ebrima"/>
+      </a:majorFont>
+      <a:minorFont>
+        <a:latin typeface="Calibri" panose="020F0502020204030204"/>
+        <a:ea typeface=""/>
+        <a:cs typeface=""/>
+        <a:font script="Jpan" typeface="游ゴシック"/>
+        <a:font script="Hang" typeface="맑은 고딕"/>
+        <a:font script="Hans" typeface="等线"/>
+        <a:font script="Hant" typeface="新細明體"/>
+        <a:font script="Arab" typeface="Arial"/>
+        <a:font script="Hebr" typeface="Arial"/>
+        <a:font script="Thai" typeface="Cordia New"/>
+        <a:font script="Ethi" typeface="Nyala"/>
+        <a:font script="Beng" typeface="Vrinda"/>
+        <a:font script="Gujr" typeface="Shruti"/>
+        <a:font script="Khmr" typeface="DaunPenh"/>
+        <a:font script="Knda" typeface="Tunga"/>
+        <a:font script="Guru" typeface="Raavi"/>
+        <a:font script="Cans" typeface="Euphemia"/>
+        <a:font script="Cher" typeface="Plantagenet Cherokee"/>
+        <a:font script="Yiii" typeface="Microsoft Yi Baiti"/>
+        <a:font script="Tibt" typeface="Microsoft Himalaya"/>
+        <a:font script="Thaa" typeface="MV Boli"/>
+        <a:font script="Deva" typeface="Mangal"/>
+        <a:font script="Telu" typeface="Gautami"/>
+        <a:font script="Taml" typeface="Latha"/>
+        <a:font script="Syrc" typeface="Estrangelo Edessa"/>
+        <a:font script="Orya" typeface="Kalinga"/>
+        <a:font script="Mlym" typeface="Kartika"/>
+        <a:font script="Laoo" typeface="DokChampa"/>
+        <a:font script="Sinh" typeface="Iskoola Pota"/>
+        <a:font script="Mong" typeface="Mongolian Baiti"/>
+        <a:font script="Viet" typeface="Arial"/>
+        <a:font script="Uigh" typeface="Microsoft Uighur"/>
+        <a:font script="Geor" typeface="Sylfaen"/>
+        <a:font script="Armn" typeface="Arial"/>
+        <a:font script="Bugi" typeface="Leelawadee UI"/>
+        <a:font script="Bopo" typeface="Microsoft JhengHei"/>
+        <a:font script="Java" typeface="Javanese Text"/>
+        <a:font script="Lisu" typeface="Segoe UI"/>
+        <a:font script="Mymr" typeface="Myanmar Text"/>
+        <a:font script="Nkoo" typeface="Ebrima"/>
+        <a:font script="Olck" typeface="Nirmala UI"/>
+        <a:font script="Osma" typeface="Ebrima"/>
+        <a:font script="Phag" typeface="Phagspa"/>
+        <a:font script="Syrn" typeface="Estrangelo Edessa"/>
+        <a:font script="Syrj" typeface="Estrangelo Edessa"/>
+        <a:font script="Syre" typeface="Estrangelo Edessa"/>
+        <a:font script="Sora" typeface="Nirmala UI"/>
+        <a:font script="Tale" typeface="Microsoft Tai Le"/>
+        <a:font script="Talu" typeface="Microsoft New Tai Lue"/>
+        <a:font script="Tfng" typeface="Ebrima"/>
+      </a:minorFont>
+    </a:fontScheme>
+    <a:fmtScheme name="Office">
+      <a:fillStyleLst>
+        <a:solidFill>
+          <a:schemeClr val="phClr"/>
+        </a:solidFill>
+        <a:gradFill rotWithShape="1">
+          <a:gsLst>
+            <a:gs pos="0">
+              <a:schemeClr val="phClr">
+                <a:lumMod val="110000"/>
+                <a:satMod val="105000"/>
+                <a:tint val="67000"/>
+              </a:schemeClr>
+            </a:gs>
+            <a:gs pos="50000">
+              <a:schemeClr val="phClr">
+                <a:lumMod val="105000"/>
+                <a:satMod val="103000"/>
+                <a:tint val="73000"/>
+              </a:schemeClr>
+            </a:gs>
+            <a:gs pos="100000">
+              <a:schemeClr val="phClr">
+                <a:lumMod val="105000"/>
+                <a:satMod val="109000"/>
+                <a:tint val="81000"/>
+              </a:schemeClr>
+            </a:gs>
+          </a:gsLst>
+          <a:lin ang="5400000" scaled="0"/>
+        </a:gradFill>
+        <a:gradFill rotWithShape="1">
+          <a:gsLst>
+            <a:gs pos="0">
+              <a:schemeClr val="phClr">
+                <a:satMod val="103000"/>
+                <a:lumMod val="102000"/>
+                <a:tint val="94000"/>
+              </a:schemeClr>
+            </a:gs>
+            <a:gs pos="50000">
+              <a:schemeClr val="phClr">
+                <a:satMod val="110000"/>
+                <a:lumMod val="100000"/>
+                <a:shade val="100000"/>
+              </a:schemeClr>
+            </a:gs>
+            <a:gs pos="100000">
+              <a:schemeClr val="phClr">
+                <a:lumMod val="99000"/>
+                <a:satMod val="120000"/>
+                <a:shade val="78000"/>
+              </a:schemeClr>
+            </a:gs>
+          </a:gsLst>
+          <a:lin ang="5400000" scaled="0"/>
+        </a:gradFill>
+      </a:fillStyleLst>
+      <a:lnStyleLst>
+        <a:ln w="6350" cap="flat" cmpd="sng" algn="ctr">
+          <a:solidFill>
+            <a:schemeClr val="phClr"/>
+          </a:solidFill>
+          <a:prstDash val="solid"/>
+          <a:miter lim="800000"/>
+        </a:ln>
+        <a:ln w="12700" cap="flat" cmpd="sng" algn="ctr">
+          <a:solidFill>
+            <a:schemeClr val="phClr"/>
+          </a:solidFill>
+          <a:prstDash val="solid"/>
+          <a:miter lim="800000"/>
+        </a:ln>
+        <a:ln w="19050" cap="flat" cmpd="sng" algn="ctr">
+          <a:solidFill>
+            <a:schemeClr val="phClr"/>
+          </a:solidFill>
+          <a:prstDash val="solid"/>
+          <a:miter lim="800000"/>
+        </a:ln>
+      </a:lnStyleLst>
+      <a:effectStyleLst>
+        <a:effectStyle>
+          <a:effectLst/>
+        </a:effectStyle>
+        <a:effectStyle>
+          <a:effectLst/>
+        </a:effectStyle>
+        <a:effectStyle>
+          <a:effectLst>
+            <a:outerShdw blurRad="57150" dist="19050" dir="5400000" algn="ctr" rotWithShape="0">
+              <a:srgbClr val="000000">
+                <a:alpha val="63000"/>
+              </a:srgbClr>
+            </a:outerShdw>
+          </a:effectLst>
+        </a:effectStyle>
+      </a:effectStyleLst>
+      <a:bgFillStyleLst>
+        <a:solidFill>
+          <a:schemeClr val="phClr"/>
+        </a:solidFill>
+        <a:solidFill>
+          <a:schemeClr val="phClr">
+            <a:tint val="95000"/>
+            <a:satMod val="170000"/>
+          </a:schemeClr>
+        </a:solidFill>
+        <a:gradFill rotWithShape="1">
+          <a:gsLst>
+            <a:gs pos="0">
+              <a:schemeClr val="phClr">
+                <a:tint val="93000"/>
+                <a:satMod val="150000"/>
+                <a:shade val="98000"/>
+                <a:lumMod val="102000"/>
+              </a:schemeClr>
+            </a:gs>
+            <a:gs pos="50000">
+              <a:schemeClr val="phClr">
+                <a:tint val="98000"/>
+                <a:satMod val="130000"/>
+                <a:shade val="90000"/>
+                <a:lumMod val="103000"/>
+              </a:schemeClr>
+            </a:gs>
+            <a:gs pos="100000">
+              <a:schemeClr val="phClr">
+                <a:shade val="63000"/>
+                <a:satMod val="120000"/>
+              </a:schemeClr>
+            </a:gs>
+          </a:gsLst>
+          <a:lin ang="5400000" scaled="0"/>
+        </a:gradFill>
+      </a:bgFillStyleLst>
+    </a:fmtScheme>
+  </a:themeElements>
+  <a:objectDefaults/>
+  <a:extraClrSchemeLst/>
+  <a:extLst>
+    <a:ext uri="{05A4C25C-085E-4340-85A3-A5531E510DB2}">
+      <thm15:themeFamily xmlns:thm15="http://schemas.microsoft.com/office/thememl/2012/main" name="Office Theme" id="{62F939B6-93AF-4DB8-9C6B-D6C7DFDC589F}" vid="{4A3C46E8-61CC-4603-A589-7422A47A8E4A}"/>
+    </a:ext>
+  </a:extLst>
+</a:theme>
 </file>
</xml_diff>